<commit_message>
Changed classes.py to piece_manager.py
</commit_message>
<xml_diff>
--- a/Demo_Presentation.pptx
+++ b/Demo_Presentation.pptx
@@ -5794,15 +5794,141 @@
             <p:ph idx="1"/>
           </p:nvPr>
         </p:nvSpPr>
-        <p:spPr/>
-        <p:txBody>
-          <a:bodyPr/>
-          <a:p>
-            <a:r>
-              <a:rPr lang="en-US" altLang="en-US" b="1"/>
-              <a:t>In VS Code.</a:t>
-            </a:r>
-            <a:endParaRPr lang="en-US" altLang="en-US" b="1"/>
+        <p:spPr>
+          <a:xfrm>
+            <a:off x="647700" y="1393825"/>
+            <a:ext cx="10515600" cy="5038725"/>
+          </a:xfrm>
+        </p:spPr>
+        <p:txBody>
+          <a:bodyPr>
+            <a:normAutofit lnSpcReduction="10000"/>
+          </a:bodyPr>
+          <a:p>
+            <a:r>
+              <a:rPr lang="" altLang="en-US" b="1"/>
+              <a:t>Total lines of code - 1350</a:t>
+            </a:r>
+            <a:endParaRPr lang="" altLang="en-US" b="1"/>
+          </a:p>
+          <a:p>
+            <a:r>
+              <a:rPr lang="" altLang="en-US" b="1"/>
+              <a:t>Split into 6 files(each file represents a concept in the form of many classes)</a:t>
+            </a:r>
+            <a:endParaRPr lang="" altLang="en-US" b="1"/>
+          </a:p>
+          <a:p>
+            <a:pPr marL="0" indent="0">
+              <a:lnSpc>
+                <a:spcPct val="120000"/>
+              </a:lnSpc>
+              <a:buNone/>
+            </a:pPr>
+            <a:r>
+              <a:rPr lang="" altLang="en-US" b="1"/>
+              <a:t>1. </a:t>
+            </a:r>
+            <a:r>
+              <a:rPr lang="" altLang="en-US" b="1" u="sng"/>
+              <a:t>own_bencoding.py</a:t>
+            </a:r>
+            <a:r>
+              <a:rPr lang="" altLang="en-US" b="1"/>
+              <a:t> - Contains classes Encoder and Decoder for bencoding and bdecoding respectively</a:t>
+            </a:r>
+            <a:endParaRPr lang="" altLang="en-US" b="1"/>
+          </a:p>
+          <a:p>
+            <a:pPr marL="0" indent="0">
+              <a:buNone/>
+            </a:pPr>
+            <a:r>
+              <a:rPr lang="" altLang="en-US" b="1"/>
+              <a:t>2. </a:t>
+            </a:r>
+            <a:r>
+              <a:rPr lang="" altLang="en-US" b="1" u="sng"/>
+              <a:t>tracker.py</a:t>
+            </a:r>
+            <a:r>
+              <a:rPr lang="" altLang="en-US" b="1"/>
+              <a:t> - Contains tracker class</a:t>
+            </a:r>
+            <a:endParaRPr lang="" altLang="en-US" b="1"/>
+          </a:p>
+          <a:p>
+            <a:pPr marL="0" indent="0">
+              <a:lnSpc>
+                <a:spcPct val="120000"/>
+              </a:lnSpc>
+              <a:buNone/>
+            </a:pPr>
+            <a:r>
+              <a:rPr lang="" altLang="en-US" b="1"/>
+              <a:t>3. </a:t>
+            </a:r>
+            <a:r>
+              <a:rPr lang="" altLang="en-US" b="1" u="sng"/>
+              <a:t>peer.py</a:t>
+            </a:r>
+            <a:r>
+              <a:rPr lang="" altLang="en-US" b="1"/>
+              <a:t> - Contains PeerConnection classes and a global PeerStreamIterator class for iterating through the stream(socket stream) of a single peer</a:t>
+            </a:r>
+            <a:endParaRPr lang="" altLang="en-US" b="1"/>
+          </a:p>
+          <a:p>
+            <a:pPr marL="0" indent="0">
+              <a:buNone/>
+            </a:pPr>
+            <a:r>
+              <a:rPr lang="" altLang="en-US" b="1"/>
+              <a:t>4. </a:t>
+            </a:r>
+            <a:r>
+              <a:rPr lang="" altLang="en-US" b="1" u="sng"/>
+              <a:t>piece_manager.py</a:t>
+            </a:r>
+            <a:r>
+              <a:rPr lang="" altLang="en-US" b="1"/>
+              <a:t> - Contains the classes PieceManager, Piece and Block.</a:t>
+            </a:r>
+            <a:endParaRPr lang="" altLang="en-US" b="1"/>
+          </a:p>
+          <a:p>
+            <a:pPr marL="0" indent="0">
+              <a:lnSpc>
+                <a:spcPct val="110000"/>
+              </a:lnSpc>
+              <a:buNone/>
+            </a:pPr>
+            <a:r>
+              <a:rPr lang="" altLang="en-US" b="1"/>
+              <a:t>5. </a:t>
+            </a:r>
+            <a:r>
+              <a:rPr lang="" altLang="en-US" b="1" u="sng"/>
+              <a:t>protocol.py</a:t>
+            </a:r>
+            <a:r>
+              <a:rPr lang="" altLang="en-US" b="1"/>
+              <a:t> - contains a class with the encoding and decoding algorithm for every type of message which can be sent/received.</a:t>
+            </a:r>
+            <a:endParaRPr lang="" altLang="en-US" b="1"/>
+          </a:p>
+          <a:p>
+            <a:pPr marL="0" indent="0">
+              <a:lnSpc>
+                <a:spcPct val="120000"/>
+              </a:lnSpc>
+              <a:buNone/>
+            </a:pPr>
+            <a:r>
+              <a:rPr lang="" altLang="en-US" b="1"/>
+              <a:t>6. async_client.py - the torrent client which runs the torrent, by directly/indirectly incorporating the above classes.</a:t>
+            </a:r>
+            <a:endParaRPr lang="" altLang="en-US" b="1"/>
           </a:p>
         </p:txBody>
       </p:sp>

</xml_diff>

<commit_message>
moved to code folder
</commit_message>
<xml_diff>
--- a/Demo_Presentation.pptx
+++ b/Demo_Presentation.pptx
@@ -8,7 +8,7 @@
     <p:notesMasterId r:id="rId4"/>
   </p:notesMasterIdLst>
   <p:handoutMasterIdLst>
-    <p:handoutMasterId r:id="rId23"/>
+    <p:handoutMasterId r:id="rId32"/>
   </p:handoutMasterIdLst>
   <p:sldIdLst>
     <p:sldId id="256" r:id="rId3"/>
@@ -16,20 +16,29 @@
     <p:sldId id="261" r:id="rId6"/>
     <p:sldId id="262" r:id="rId7"/>
     <p:sldId id="263" r:id="rId8"/>
-    <p:sldId id="265" r:id="rId9"/>
+    <p:sldId id="283" r:id="rId9"/>
     <p:sldId id="266" r:id="rId10"/>
     <p:sldId id="267" r:id="rId11"/>
     <p:sldId id="268" r:id="rId12"/>
     <p:sldId id="269" r:id="rId13"/>
     <p:sldId id="270" r:id="rId14"/>
-    <p:sldId id="271" r:id="rId15"/>
-    <p:sldId id="273" r:id="rId16"/>
-    <p:sldId id="274" r:id="rId17"/>
-    <p:sldId id="275" r:id="rId18"/>
-    <p:sldId id="276" r:id="rId19"/>
-    <p:sldId id="278" r:id="rId20"/>
-    <p:sldId id="281" r:id="rId21"/>
-    <p:sldId id="277" r:id="rId22"/>
+    <p:sldId id="284" r:id="rId15"/>
+    <p:sldId id="271" r:id="rId16"/>
+    <p:sldId id="285" r:id="rId17"/>
+    <p:sldId id="273" r:id="rId18"/>
+    <p:sldId id="286" r:id="rId19"/>
+    <p:sldId id="287" r:id="rId20"/>
+    <p:sldId id="274" r:id="rId21"/>
+    <p:sldId id="288" r:id="rId22"/>
+    <p:sldId id="275" r:id="rId23"/>
+    <p:sldId id="289" r:id="rId24"/>
+    <p:sldId id="290" r:id="rId25"/>
+    <p:sldId id="282" r:id="rId26"/>
+    <p:sldId id="276" r:id="rId27"/>
+    <p:sldId id="278" r:id="rId28"/>
+    <p:sldId id="291" r:id="rId29"/>
+    <p:sldId id="281" r:id="rId30"/>
+    <p:sldId id="277" r:id="rId31"/>
   </p:sldIdLst>
   <p:sldSz cx="12192000" cy="6858000"/>
   <p:notesSz cx="7103745" cy="10234295"/>
@@ -1133,6 +1142,402 @@
 </file>
 
 <file path=ppt/notesSlides/notesSlide2.xml><?xml version="1.0" encoding="utf-8"?>
+<p:notes xmlns:a="http://schemas.openxmlformats.org/drawingml/2006/main" xmlns:r="http://schemas.openxmlformats.org/officeDocument/2006/relationships" xmlns:p="http://schemas.openxmlformats.org/presentationml/2006/main">
+  <p:cSld>
+    <p:spTree>
+      <p:nvGrpSpPr>
+        <p:cNvPr id="1" name=""/>
+        <p:cNvGrpSpPr/>
+        <p:nvPr/>
+      </p:nvGrpSpPr>
+      <p:grpSpPr/>
+      <p:sp>
+        <p:nvSpPr>
+          <p:cNvPr id="2" name="Slide Image Placeholder 1"/>
+          <p:cNvSpPr/>
+          <p:nvPr>
+            <p:ph type="sldImg" idx="2"/>
+          </p:nvPr>
+        </p:nvSpPr>
+        <p:spPr/>
+      </p:sp>
+      <p:sp>
+        <p:nvSpPr>
+          <p:cNvPr id="3" name="Text Placeholder 2"/>
+          <p:cNvSpPr/>
+          <p:nvPr>
+            <p:ph type="body" idx="3"/>
+          </p:nvPr>
+        </p:nvSpPr>
+        <p:spPr/>
+        <p:txBody>
+          <a:bodyPr/>
+          <a:p>
+            <a:endParaRPr lang="en-US"/>
+          </a:p>
+        </p:txBody>
+      </p:sp>
+    </p:spTree>
+  </p:cSld>
+  <p:clrMapOvr>
+    <a:masterClrMapping/>
+  </p:clrMapOvr>
+</p:notes>
+</file>
+
+<file path=ppt/notesSlides/notesSlide20.xml><?xml version="1.0" encoding="utf-8"?>
+<p:notes xmlns:a="http://schemas.openxmlformats.org/drawingml/2006/main" xmlns:r="http://schemas.openxmlformats.org/officeDocument/2006/relationships" xmlns:p="http://schemas.openxmlformats.org/presentationml/2006/main">
+  <p:cSld>
+    <p:spTree>
+      <p:nvGrpSpPr>
+        <p:cNvPr id="1" name=""/>
+        <p:cNvGrpSpPr/>
+        <p:nvPr/>
+      </p:nvGrpSpPr>
+      <p:grpSpPr/>
+      <p:sp>
+        <p:nvSpPr>
+          <p:cNvPr id="2" name="Slide Image Placeholder 1"/>
+          <p:cNvSpPr/>
+          <p:nvPr>
+            <p:ph type="sldImg" idx="2"/>
+          </p:nvPr>
+        </p:nvSpPr>
+        <p:spPr/>
+      </p:sp>
+      <p:sp>
+        <p:nvSpPr>
+          <p:cNvPr id="3" name="Text Placeholder 2"/>
+          <p:cNvSpPr/>
+          <p:nvPr>
+            <p:ph type="body" idx="3"/>
+          </p:nvPr>
+        </p:nvSpPr>
+        <p:spPr/>
+        <p:txBody>
+          <a:bodyPr/>
+          <a:p>
+            <a:endParaRPr lang="en-US"/>
+          </a:p>
+        </p:txBody>
+      </p:sp>
+    </p:spTree>
+  </p:cSld>
+  <p:clrMapOvr>
+    <a:masterClrMapping/>
+  </p:clrMapOvr>
+</p:notes>
+</file>
+
+<file path=ppt/notesSlides/notesSlide21.xml><?xml version="1.0" encoding="utf-8"?>
+<p:notes xmlns:a="http://schemas.openxmlformats.org/drawingml/2006/main" xmlns:r="http://schemas.openxmlformats.org/officeDocument/2006/relationships" xmlns:p="http://schemas.openxmlformats.org/presentationml/2006/main">
+  <p:cSld>
+    <p:spTree>
+      <p:nvGrpSpPr>
+        <p:cNvPr id="1" name=""/>
+        <p:cNvGrpSpPr/>
+        <p:nvPr/>
+      </p:nvGrpSpPr>
+      <p:grpSpPr/>
+      <p:sp>
+        <p:nvSpPr>
+          <p:cNvPr id="2" name="Slide Image Placeholder 1"/>
+          <p:cNvSpPr/>
+          <p:nvPr>
+            <p:ph type="sldImg" idx="2"/>
+          </p:nvPr>
+        </p:nvSpPr>
+        <p:spPr/>
+      </p:sp>
+      <p:sp>
+        <p:nvSpPr>
+          <p:cNvPr id="3" name="Text Placeholder 2"/>
+          <p:cNvSpPr/>
+          <p:nvPr>
+            <p:ph type="body" idx="3"/>
+          </p:nvPr>
+        </p:nvSpPr>
+        <p:spPr/>
+        <p:txBody>
+          <a:bodyPr/>
+          <a:p>
+            <a:endParaRPr lang="en-US"/>
+          </a:p>
+        </p:txBody>
+      </p:sp>
+    </p:spTree>
+  </p:cSld>
+  <p:clrMapOvr>
+    <a:masterClrMapping/>
+  </p:clrMapOvr>
+</p:notes>
+</file>
+
+<file path=ppt/notesSlides/notesSlide22.xml><?xml version="1.0" encoding="utf-8"?>
+<p:notes xmlns:a="http://schemas.openxmlformats.org/drawingml/2006/main" xmlns:r="http://schemas.openxmlformats.org/officeDocument/2006/relationships" xmlns:p="http://schemas.openxmlformats.org/presentationml/2006/main">
+  <p:cSld>
+    <p:spTree>
+      <p:nvGrpSpPr>
+        <p:cNvPr id="1" name=""/>
+        <p:cNvGrpSpPr/>
+        <p:nvPr/>
+      </p:nvGrpSpPr>
+      <p:grpSpPr/>
+      <p:sp>
+        <p:nvSpPr>
+          <p:cNvPr id="2" name="Slide Image Placeholder 1"/>
+          <p:cNvSpPr/>
+          <p:nvPr>
+            <p:ph type="sldImg" idx="2"/>
+          </p:nvPr>
+        </p:nvSpPr>
+        <p:spPr/>
+      </p:sp>
+      <p:sp>
+        <p:nvSpPr>
+          <p:cNvPr id="3" name="Text Placeholder 2"/>
+          <p:cNvSpPr/>
+          <p:nvPr>
+            <p:ph type="body" idx="3"/>
+          </p:nvPr>
+        </p:nvSpPr>
+        <p:spPr/>
+        <p:txBody>
+          <a:bodyPr/>
+          <a:p>
+            <a:endParaRPr lang="en-US"/>
+          </a:p>
+        </p:txBody>
+      </p:sp>
+    </p:spTree>
+  </p:cSld>
+  <p:clrMapOvr>
+    <a:masterClrMapping/>
+  </p:clrMapOvr>
+</p:notes>
+</file>
+
+<file path=ppt/notesSlides/notesSlide23.xml><?xml version="1.0" encoding="utf-8"?>
+<p:notes xmlns:a="http://schemas.openxmlformats.org/drawingml/2006/main" xmlns:r="http://schemas.openxmlformats.org/officeDocument/2006/relationships" xmlns:p="http://schemas.openxmlformats.org/presentationml/2006/main">
+  <p:cSld>
+    <p:spTree>
+      <p:nvGrpSpPr>
+        <p:cNvPr id="1" name=""/>
+        <p:cNvGrpSpPr/>
+        <p:nvPr/>
+      </p:nvGrpSpPr>
+      <p:grpSpPr/>
+      <p:sp>
+        <p:nvSpPr>
+          <p:cNvPr id="2" name="Slide Image Placeholder 1"/>
+          <p:cNvSpPr/>
+          <p:nvPr>
+            <p:ph type="sldImg" idx="2"/>
+          </p:nvPr>
+        </p:nvSpPr>
+        <p:spPr/>
+      </p:sp>
+      <p:sp>
+        <p:nvSpPr>
+          <p:cNvPr id="3" name="Text Placeholder 2"/>
+          <p:cNvSpPr/>
+          <p:nvPr>
+            <p:ph type="body" idx="3"/>
+          </p:nvPr>
+        </p:nvSpPr>
+        <p:spPr/>
+        <p:txBody>
+          <a:bodyPr/>
+          <a:p>
+            <a:endParaRPr lang="en-US"/>
+          </a:p>
+        </p:txBody>
+      </p:sp>
+    </p:spTree>
+  </p:cSld>
+  <p:clrMapOvr>
+    <a:masterClrMapping/>
+  </p:clrMapOvr>
+</p:notes>
+</file>
+
+<file path=ppt/notesSlides/notesSlide24.xml><?xml version="1.0" encoding="utf-8"?>
+<p:notes xmlns:a="http://schemas.openxmlformats.org/drawingml/2006/main" xmlns:r="http://schemas.openxmlformats.org/officeDocument/2006/relationships" xmlns:p="http://schemas.openxmlformats.org/presentationml/2006/main">
+  <p:cSld>
+    <p:spTree>
+      <p:nvGrpSpPr>
+        <p:cNvPr id="1" name=""/>
+        <p:cNvGrpSpPr/>
+        <p:nvPr/>
+      </p:nvGrpSpPr>
+      <p:grpSpPr/>
+      <p:sp>
+        <p:nvSpPr>
+          <p:cNvPr id="2" name="Slide Image Placeholder 1"/>
+          <p:cNvSpPr/>
+          <p:nvPr>
+            <p:ph type="sldImg" idx="2"/>
+          </p:nvPr>
+        </p:nvSpPr>
+        <p:spPr/>
+      </p:sp>
+      <p:sp>
+        <p:nvSpPr>
+          <p:cNvPr id="3" name="Text Placeholder 2"/>
+          <p:cNvSpPr/>
+          <p:nvPr>
+            <p:ph type="body" idx="3"/>
+          </p:nvPr>
+        </p:nvSpPr>
+        <p:spPr/>
+        <p:txBody>
+          <a:bodyPr/>
+          <a:p>
+            <a:endParaRPr lang="en-US"/>
+          </a:p>
+        </p:txBody>
+      </p:sp>
+    </p:spTree>
+  </p:cSld>
+  <p:clrMapOvr>
+    <a:masterClrMapping/>
+  </p:clrMapOvr>
+</p:notes>
+</file>
+
+<file path=ppt/notesSlides/notesSlide25.xml><?xml version="1.0" encoding="utf-8"?>
+<p:notes xmlns:a="http://schemas.openxmlformats.org/drawingml/2006/main" xmlns:r="http://schemas.openxmlformats.org/officeDocument/2006/relationships" xmlns:p="http://schemas.openxmlformats.org/presentationml/2006/main">
+  <p:cSld>
+    <p:spTree>
+      <p:nvGrpSpPr>
+        <p:cNvPr id="1" name=""/>
+        <p:cNvGrpSpPr/>
+        <p:nvPr/>
+      </p:nvGrpSpPr>
+      <p:grpSpPr/>
+      <p:sp>
+        <p:nvSpPr>
+          <p:cNvPr id="2" name="Slide Image Placeholder 1"/>
+          <p:cNvSpPr/>
+          <p:nvPr>
+            <p:ph type="sldImg" idx="2"/>
+          </p:nvPr>
+        </p:nvSpPr>
+        <p:spPr/>
+      </p:sp>
+      <p:sp>
+        <p:nvSpPr>
+          <p:cNvPr id="3" name="Text Placeholder 2"/>
+          <p:cNvSpPr/>
+          <p:nvPr>
+            <p:ph type="body" idx="3"/>
+          </p:nvPr>
+        </p:nvSpPr>
+        <p:spPr/>
+        <p:txBody>
+          <a:bodyPr/>
+          <a:p>
+            <a:endParaRPr lang="en-US"/>
+          </a:p>
+        </p:txBody>
+      </p:sp>
+    </p:spTree>
+  </p:cSld>
+  <p:clrMapOvr>
+    <a:masterClrMapping/>
+  </p:clrMapOvr>
+</p:notes>
+</file>
+
+<file path=ppt/notesSlides/notesSlide26.xml><?xml version="1.0" encoding="utf-8"?>
+<p:notes xmlns:a="http://schemas.openxmlformats.org/drawingml/2006/main" xmlns:r="http://schemas.openxmlformats.org/officeDocument/2006/relationships" xmlns:p="http://schemas.openxmlformats.org/presentationml/2006/main">
+  <p:cSld>
+    <p:spTree>
+      <p:nvGrpSpPr>
+        <p:cNvPr id="1" name=""/>
+        <p:cNvGrpSpPr/>
+        <p:nvPr/>
+      </p:nvGrpSpPr>
+      <p:grpSpPr/>
+      <p:sp>
+        <p:nvSpPr>
+          <p:cNvPr id="2" name="Slide Image Placeholder 1"/>
+          <p:cNvSpPr/>
+          <p:nvPr>
+            <p:ph type="sldImg" idx="2"/>
+          </p:nvPr>
+        </p:nvSpPr>
+        <p:spPr/>
+      </p:sp>
+      <p:sp>
+        <p:nvSpPr>
+          <p:cNvPr id="3" name="Text Placeholder 2"/>
+          <p:cNvSpPr/>
+          <p:nvPr>
+            <p:ph type="body" idx="3"/>
+          </p:nvPr>
+        </p:nvSpPr>
+        <p:spPr/>
+        <p:txBody>
+          <a:bodyPr/>
+          <a:p>
+            <a:endParaRPr lang="en-US"/>
+          </a:p>
+        </p:txBody>
+      </p:sp>
+    </p:spTree>
+  </p:cSld>
+  <p:clrMapOvr>
+    <a:masterClrMapping/>
+  </p:clrMapOvr>
+</p:notes>
+</file>
+
+<file path=ppt/notesSlides/notesSlide27.xml><?xml version="1.0" encoding="utf-8"?>
+<p:notes xmlns:a="http://schemas.openxmlformats.org/drawingml/2006/main" xmlns:r="http://schemas.openxmlformats.org/officeDocument/2006/relationships" xmlns:p="http://schemas.openxmlformats.org/presentationml/2006/main">
+  <p:cSld>
+    <p:spTree>
+      <p:nvGrpSpPr>
+        <p:cNvPr id="1" name=""/>
+        <p:cNvGrpSpPr/>
+        <p:nvPr/>
+      </p:nvGrpSpPr>
+      <p:grpSpPr/>
+      <p:sp>
+        <p:nvSpPr>
+          <p:cNvPr id="2" name="Slide Image Placeholder 1"/>
+          <p:cNvSpPr/>
+          <p:nvPr>
+            <p:ph type="sldImg" idx="2"/>
+          </p:nvPr>
+        </p:nvSpPr>
+        <p:spPr/>
+      </p:sp>
+      <p:sp>
+        <p:nvSpPr>
+          <p:cNvPr id="3" name="Text Placeholder 2"/>
+          <p:cNvSpPr/>
+          <p:nvPr>
+            <p:ph type="body" idx="3"/>
+          </p:nvPr>
+        </p:nvSpPr>
+        <p:spPr/>
+        <p:txBody>
+          <a:bodyPr/>
+          <a:p>
+            <a:endParaRPr lang="en-US"/>
+          </a:p>
+        </p:txBody>
+      </p:sp>
+    </p:spTree>
+  </p:cSld>
+  <p:clrMapOvr>
+    <a:masterClrMapping/>
+  </p:clrMapOvr>
+</p:notes>
+</file>
+
+<file path=ppt/notesSlides/notesSlide28.xml><?xml version="1.0" encoding="utf-8"?>
 <p:notes xmlns:a="http://schemas.openxmlformats.org/drawingml/2006/main" xmlns:r="http://schemas.openxmlformats.org/officeDocument/2006/relationships" xmlns:p="http://schemas.openxmlformats.org/presentationml/2006/main">
   <p:cSld>
     <p:spTree>
@@ -4874,7 +5279,7 @@
         </p:spPr>
         <p:txBody>
           <a:bodyPr>
-            <a:normAutofit lnSpcReduction="10000"/>
+            <a:normAutofit lnSpcReduction="20000"/>
           </a:bodyPr>
           <a:p>
             <a:pPr algn="l"/>
@@ -4902,6 +5307,30 @@
                 <a:spcPct val="160000"/>
               </a:lnSpc>
             </a:pPr>
+            <a:endParaRPr lang="en-US" altLang="en-US" b="1" u="sng"/>
+          </a:p>
+          <a:p>
+            <a:pPr algn="l">
+              <a:lnSpc>
+                <a:spcPct val="160000"/>
+              </a:lnSpc>
+            </a:pPr>
+            <a:endParaRPr lang="en-US" altLang="en-US" b="1" u="sng"/>
+          </a:p>
+          <a:p>
+            <a:pPr algn="l">
+              <a:lnSpc>
+                <a:spcPct val="160000"/>
+              </a:lnSpc>
+            </a:pPr>
+            <a:endParaRPr lang="en-US" altLang="en-US" b="1" u="sng"/>
+          </a:p>
+          <a:p>
+            <a:pPr algn="l">
+              <a:lnSpc>
+                <a:spcPct val="160000"/>
+              </a:lnSpc>
+            </a:pPr>
             <a:r>
               <a:rPr lang="en-US" altLang="en-US" b="1" u="sng"/>
               <a:t>We have to determine if they are active, by attempting to connect with them.</a:t>
@@ -4914,48 +5343,6 @@
                 <a:spcPct val="160000"/>
               </a:lnSpc>
             </a:pPr>
-            <a:endParaRPr lang="en-US" altLang="en-US" b="1"/>
-          </a:p>
-          <a:p>
-            <a:pPr algn="l">
-              <a:lnSpc>
-                <a:spcPct val="160000"/>
-              </a:lnSpc>
-            </a:pPr>
-            <a:r>
-              <a:rPr lang="en-US" altLang="en-US" b="1"/>
-              <a:t>So, using a  protocol, for every connection established peer, the following happens:</a:t>
-            </a:r>
-            <a:endParaRPr lang="en-US" altLang="en-US" b="1"/>
-          </a:p>
-          <a:p>
-            <a:pPr marL="0" indent="0" algn="l">
-              <a:lnSpc>
-                <a:spcPct val="160000"/>
-              </a:lnSpc>
-              <a:buNone/>
-            </a:pPr>
-            <a:r>
-              <a:rPr lang="en-US" altLang="en-US" b="1"/>
-              <a:t>1. We send a handshake message, and wait for a handshake.</a:t>
-            </a:r>
-            <a:endParaRPr lang="en-US" altLang="en-US" b="1"/>
-          </a:p>
-          <a:p>
-            <a:pPr marL="0" indent="0" algn="l">
-              <a:lnSpc>
-                <a:spcPct val="160000"/>
-              </a:lnSpc>
-              <a:buNone/>
-            </a:pPr>
-            <a:r>
-              <a:rPr lang="en-US" altLang="en-US" b="1"/>
-              <a:t>2. If we receive a handshake, the peer will send a message called a </a:t>
-            </a:r>
-            <a:r>
-              <a:rPr lang="en-US" altLang="en-US" b="1" u="sng"/>
-              <a:t>bitfield.</a:t>
-            </a:r>
             <a:endParaRPr lang="en-US" altLang="en-US" b="1"/>
           </a:p>
           <a:p>
@@ -5100,7 +5487,7 @@
         </p:spPr>
         <p:txBody>
           <a:bodyPr>
-            <a:normAutofit fontScale="90000" lnSpcReduction="10000"/>
+            <a:normAutofit fontScale="90000"/>
           </a:bodyPr>
           <a:p>
             <a:pPr algn="l"/>
@@ -5109,19 +5496,96 @@
           <a:p>
             <a:pPr algn="l">
               <a:lnSpc>
-                <a:spcPct val="130000"/>
-              </a:lnSpc>
-            </a:pPr>
-            <a:r>
-              <a:rPr lang="en-US" altLang="en-US" b="1"/>
+                <a:spcPct val="160000"/>
+              </a:lnSpc>
+            </a:pPr>
+            <a:r>
+              <a:rPr lang="en-US" altLang="en-US" b="1">
+                <a:sym typeface="+mn-ea"/>
+              </a:rPr>
+              <a:t>So, using a  protocol, for every connection established peer, the following happens:</a:t>
+            </a:r>
+            <a:endParaRPr lang="en-US" altLang="en-US" b="1">
+              <a:sym typeface="+mn-ea"/>
+            </a:endParaRPr>
+          </a:p>
+          <a:p>
+            <a:pPr algn="l">
+              <a:lnSpc>
+                <a:spcPct val="160000"/>
+              </a:lnSpc>
+            </a:pPr>
+            <a:endParaRPr lang="en-US" altLang="en-US" b="1"/>
+          </a:p>
+          <a:p>
+            <a:pPr marL="0" indent="0" algn="l">
+              <a:lnSpc>
+                <a:spcPct val="160000"/>
+              </a:lnSpc>
+              <a:buNone/>
+            </a:pPr>
+            <a:r>
+              <a:rPr lang="en-US" altLang="en-US" b="1">
+                <a:sym typeface="+mn-ea"/>
+              </a:rPr>
+              <a:t>1. We send a handshake message, and wait for a handshake.</a:t>
+            </a:r>
+            <a:endParaRPr lang="en-US" altLang="en-US" b="1">
+              <a:sym typeface="+mn-ea"/>
+            </a:endParaRPr>
+          </a:p>
+          <a:p>
+            <a:pPr marL="0" indent="0" algn="l">
+              <a:lnSpc>
+                <a:spcPct val="160000"/>
+              </a:lnSpc>
+              <a:buNone/>
+            </a:pPr>
+            <a:endParaRPr lang="en-US" altLang="en-US" b="1"/>
+          </a:p>
+          <a:p>
+            <a:pPr marL="0" indent="0" algn="l">
+              <a:lnSpc>
+                <a:spcPct val="160000"/>
+              </a:lnSpc>
+              <a:buNone/>
+            </a:pPr>
+            <a:r>
+              <a:rPr lang="en-US" altLang="en-US" b="1">
+                <a:sym typeface="+mn-ea"/>
+              </a:rPr>
+              <a:t>2. If we receive a handshake, the peer will send a message called a </a:t>
+            </a:r>
+            <a:r>
+              <a:rPr lang="en-US" altLang="en-US" b="1" u="sng">
+                <a:sym typeface="+mn-ea"/>
+              </a:rPr>
+              <a:t>bitfield.</a:t>
+            </a:r>
+            <a:endParaRPr lang="en-US" altLang="en-US" b="1"/>
+          </a:p>
+          <a:p>
+            <a:pPr algn="l">
+              <a:lnSpc>
+                <a:spcPct val="160000"/>
+              </a:lnSpc>
+            </a:pPr>
+            <a:r>
+              <a:rPr lang="en-US" altLang="en-US" b="1">
+                <a:sym typeface="+mn-ea"/>
+              </a:rPr>
               <a:t>This </a:t>
             </a:r>
             <a:r>
-              <a:rPr lang="en-US" altLang="en-US" b="1" u="sng"/>
+              <a:rPr lang="en-US" altLang="en-US" b="1" u="sng">
+                <a:sym typeface="+mn-ea"/>
+              </a:rPr>
               <a:t>bitfield</a:t>
             </a:r>
             <a:r>
-              <a:rPr lang="en-US" altLang="en-US" b="1"/>
+              <a:rPr lang="en-US" altLang="en-US" b="1">
+                <a:sym typeface="+mn-ea"/>
+              </a:rPr>
               <a:t> contains a string of length number of pieces, and has a 1 in the piece if that peer has the piece, 0 if it doesnt.</a:t>
             </a:r>
             <a:endParaRPr lang="en-US" altLang="en-US" b="1"/>
@@ -5129,89 +5593,17 @@
           <a:p>
             <a:pPr algn="l">
               <a:lnSpc>
-                <a:spcPct val="130000"/>
-              </a:lnSpc>
-            </a:pPr>
-            <a:r>
-              <a:rPr lang="en-US" altLang="en-US" b="1"/>
-              <a:t>3. We send an interested message to indicate that we are interested to receive pieces from that peer, if we want to receive pieces.</a:t>
-            </a:r>
-            <a:endParaRPr lang="en-US" altLang="en-US" b="1"/>
+                <a:spcPct val="160000"/>
+              </a:lnSpc>
+            </a:pPr>
+            <a:endParaRPr lang="en-US" altLang="en-US" b="1" u="sng"/>
           </a:p>
           <a:p>
             <a:pPr algn="l">
               <a:lnSpc>
-                <a:spcPct val="130000"/>
-              </a:lnSpc>
-            </a:pPr>
-            <a:r>
-              <a:rPr lang="en-US" altLang="en-US" b="1"/>
-              <a:t>4. We wait for an </a:t>
-            </a:r>
-            <a:r>
-              <a:rPr lang="en-US" altLang="en-US" b="1" u="sng"/>
-              <a:t>unchoke</a:t>
-            </a:r>
-            <a:r>
-              <a:rPr lang="en-US" altLang="en-US" b="1"/>
-              <a:t> which means the peer is ready to serve us.</a:t>
-            </a:r>
-            <a:endParaRPr lang="en-US" altLang="en-US" b="1"/>
-          </a:p>
-          <a:p>
-            <a:pPr algn="l">
-              <a:lnSpc>
-                <a:spcPct val="130000"/>
-              </a:lnSpc>
-            </a:pPr>
-            <a:r>
-              <a:rPr lang="en-US" altLang="en-US" b="1"/>
-              <a:t>(All connections are by default not interested, and choked)</a:t>
-            </a:r>
-            <a:endParaRPr lang="en-US" altLang="en-US" b="1"/>
-          </a:p>
-          <a:p>
-            <a:pPr algn="l">
-              <a:lnSpc>
-                <a:spcPct val="130000"/>
-              </a:lnSpc>
-            </a:pPr>
-            <a:r>
-              <a:rPr lang="en-US" altLang="en-US" b="1"/>
-              <a:t>5. Then, by a series of requests, we request parts of pieces</a:t>
-            </a:r>
-            <a:r>
-              <a:rPr lang="en-US" altLang="en-US" b="1" u="sng"/>
-              <a:t>(blocks) </a:t>
-            </a:r>
-            <a:r>
-              <a:rPr lang="en-US" altLang="en-US" b="1"/>
-              <a:t>from the peer using a particular message, and receive them.</a:t>
-            </a:r>
-            <a:endParaRPr lang="en-US" altLang="en-US" b="1"/>
-          </a:p>
-          <a:p>
-            <a:pPr algn="l">
-              <a:lnSpc>
-                <a:spcPct val="130000"/>
-              </a:lnSpc>
-            </a:pPr>
-            <a:r>
-              <a:rPr lang="en-US" altLang="en-US" b="1"/>
-              <a:t>6. If an entire piece is received, we hash it and check it with the HASH in the torrent, if it is matching, we write to disk.</a:t>
-            </a:r>
-            <a:endParaRPr lang="en-US" altLang="en-US" b="1"/>
-          </a:p>
-          <a:p>
-            <a:pPr algn="l">
-              <a:lnSpc>
-                <a:spcPct val="130000"/>
-              </a:lnSpc>
-            </a:pPr>
-            <a:r>
-              <a:rPr lang="en-US" altLang="en-US" b="1"/>
-              <a:t>7. When we have atleast one piece, we are ready to serve other clients(uploading/seeding)</a:t>
-            </a:r>
+                <a:spcPct val="160000"/>
+              </a:lnSpc>
+            </a:pPr>
             <a:endParaRPr lang="en-US" altLang="en-US" b="1"/>
           </a:p>
           <a:p>
@@ -5329,7 +5721,7 @@
                 <a:latin typeface="Gubbi" panose="00000400000000000000" charset="0"/>
                 <a:cs typeface="Gubbi" panose="00000400000000000000" charset="0"/>
               </a:rPr>
-              <a:t>CHALLENGES AND INTRICACIES</a:t>
+              <a:t>CONCEPT</a:t>
             </a:r>
             <a:endParaRPr lang="en-US" altLang="en-US" sz="4000">
               <a:latin typeface="Gubbi" panose="00000400000000000000" charset="0"/>
@@ -5356,7 +5748,7 @@
         </p:spPr>
         <p:txBody>
           <a:bodyPr>
-            <a:normAutofit lnSpcReduction="20000"/>
+            <a:normAutofit/>
           </a:bodyPr>
           <a:p>
             <a:pPr algn="l"/>
@@ -5368,9 +5760,17 @@
                 <a:spcPct val="130000"/>
               </a:lnSpc>
             </a:pPr>
+            <a:endParaRPr lang="en-US" altLang="en-US" b="1"/>
+          </a:p>
+          <a:p>
+            <a:pPr algn="l">
+              <a:lnSpc>
+                <a:spcPct val="130000"/>
+              </a:lnSpc>
+            </a:pPr>
             <a:r>
               <a:rPr lang="en-US" altLang="en-US" b="1"/>
-              <a:t>One challenge is to have peer connections to be concurrent.</a:t>
+              <a:t>3. We send an interested message to indicate that we are interested to receive pieces from that peer, if we want to receive pieces.</a:t>
             </a:r>
             <a:endParaRPr lang="en-US" altLang="en-US" b="1"/>
           </a:p>
@@ -5380,9 +5780,41 @@
                 <a:spcPct val="130000"/>
               </a:lnSpc>
             </a:pPr>
+            <a:endParaRPr lang="en-US" altLang="en-US" b="1"/>
+          </a:p>
+          <a:p>
+            <a:pPr algn="l">
+              <a:lnSpc>
+                <a:spcPct val="130000"/>
+              </a:lnSpc>
+            </a:pPr>
+            <a:endParaRPr lang="en-US" altLang="en-US" b="1"/>
+          </a:p>
+          <a:p>
+            <a:pPr algn="l">
+              <a:lnSpc>
+                <a:spcPct val="130000"/>
+              </a:lnSpc>
+            </a:pPr>
+            <a:endParaRPr lang="en-US" altLang="en-US" b="1"/>
+          </a:p>
+          <a:p>
+            <a:pPr algn="l">
+              <a:lnSpc>
+                <a:spcPct val="130000"/>
+              </a:lnSpc>
+            </a:pPr>
             <a:r>
               <a:rPr lang="en-US" altLang="en-US" b="1"/>
-              <a:t>Optimize which piece to ask the peer, based on its bitfield.(Here, the piece by order is used)</a:t>
+              <a:t>4. We wait for an </a:t>
+            </a:r>
+            <a:r>
+              <a:rPr lang="en-US" altLang="en-US" b="1" u="sng"/>
+              <a:t>unchoke</a:t>
+            </a:r>
+            <a:r>
+              <a:rPr lang="en-US" altLang="en-US" b="1"/>
+              <a:t> which means the peer is ready to serve us.</a:t>
             </a:r>
             <a:endParaRPr lang="en-US" altLang="en-US" b="1"/>
           </a:p>
@@ -5394,44 +5826,16 @@
             </a:pPr>
             <a:r>
               <a:rPr lang="en-US" altLang="en-US" b="1"/>
-              <a:t>Difficulty in managing sockets - the messages are not sent as a single message.</a:t>
+              <a:t>(All connections are by default not interested, and choked)</a:t>
             </a:r>
             <a:endParaRPr lang="en-US" altLang="en-US" b="1"/>
           </a:p>
           <a:p>
             <a:pPr algn="l">
               <a:lnSpc>
-                <a:spcPct val="130000"/>
-              </a:lnSpc>
-            </a:pPr>
-            <a:r>
-              <a:rPr lang="en-US" altLang="en-US" b="1" u="sng"/>
-              <a:t>They can be send part-by-part, so we have to buffer the messages until we get something of meaning.</a:t>
-            </a:r>
-            <a:endParaRPr lang="en-US" altLang="en-US" b="1" u="sng"/>
-          </a:p>
-          <a:p>
-            <a:pPr algn="l">
-              <a:lnSpc>
-                <a:spcPct val="130000"/>
-              </a:lnSpc>
-            </a:pPr>
-            <a:r>
-              <a:rPr lang="en-US" altLang="en-US" b="1" u="sng"/>
-              <a:t>Or many messages can be sent together, so we have to properly decode every message and make sure nothing is lost.</a:t>
-            </a:r>
-            <a:endParaRPr lang="en-US" altLang="en-US" b="1"/>
-          </a:p>
-          <a:p>
-            <a:pPr algn="l">
-              <a:lnSpc>
                 <a:spcPct val="160000"/>
               </a:lnSpc>
             </a:pPr>
-            <a:r>
-              <a:rPr lang="en-US" altLang="en-US" b="1"/>
-              <a:t>Optimize the peers obtained - worst case - all peers are inactive - we have to make sure we request the tracker again, and get peers.</a:t>
-            </a:r>
             <a:endParaRPr lang="en-US" altLang="en-US" b="1"/>
           </a:p>
         </p:txBody>
@@ -5541,7 +5945,7 @@
                 <a:latin typeface="Gubbi" panose="00000400000000000000" charset="0"/>
                 <a:cs typeface="Gubbi" panose="00000400000000000000" charset="0"/>
               </a:rPr>
-              <a:t>IMPLEMENTATION</a:t>
+              <a:t>CONCEPT</a:t>
             </a:r>
             <a:endParaRPr lang="en-US" altLang="en-US" sz="4000">
               <a:latin typeface="Gubbi" panose="00000400000000000000" charset="0"/>
@@ -5568,27 +5972,39 @@
         </p:spPr>
         <p:txBody>
           <a:bodyPr>
-            <a:normAutofit lnSpcReduction="20000"/>
+            <a:normAutofit/>
           </a:bodyPr>
           <a:p>
             <a:pPr algn="l"/>
             <a:endParaRPr lang="en-US" altLang="en-US" b="1"/>
           </a:p>
           <a:p>
-            <a:pPr algn="l"/>
-            <a:endParaRPr lang="en-US" altLang="en-US" b="1"/>
-          </a:p>
-          <a:p>
             <a:pPr algn="l">
               <a:lnSpc>
-                <a:spcPct val="140000"/>
-              </a:lnSpc>
-            </a:pPr>
-            <a:r>
-              <a:rPr lang="en-US" altLang="en-US" b="1"/>
-              <a:t>The implementation of the BitTorrent client(the torrent downloader) has been done in Python 3.7</a:t>
-            </a:r>
-            <a:endParaRPr lang="en-US" altLang="en-US" b="1"/>
+                <a:spcPct val="130000"/>
+              </a:lnSpc>
+            </a:pPr>
+            <a:r>
+              <a:rPr lang="en-US" altLang="en-US" b="1">
+                <a:sym typeface="+mn-ea"/>
+              </a:rPr>
+              <a:t>5. Then, by a series of requests, we request parts of pieces</a:t>
+            </a:r>
+            <a:r>
+              <a:rPr lang="en-US" altLang="en-US" b="1" u="sng">
+                <a:sym typeface="+mn-ea"/>
+              </a:rPr>
+              <a:t>(blocks) </a:t>
+            </a:r>
+            <a:r>
+              <a:rPr lang="en-US" altLang="en-US" b="1">
+                <a:sym typeface="+mn-ea"/>
+              </a:rPr>
+              <a:t>from the peer using a particular message, and receive them.</a:t>
+            </a:r>
+            <a:endParaRPr lang="en-US" altLang="en-US" b="1">
+              <a:sym typeface="+mn-ea"/>
+            </a:endParaRPr>
           </a:p>
           <a:p>
             <a:pPr algn="l">
@@ -5596,10 +6012,6 @@
                 <a:spcPct val="130000"/>
               </a:lnSpc>
             </a:pPr>
-            <a:r>
-              <a:rPr lang="en-US" altLang="en-US" b="1"/>
-              <a:t>The bencoding library has been written from scratch, to understand how this basic encoding and decoding works.</a:t>
-            </a:r>
             <a:endParaRPr lang="en-US" altLang="en-US" b="1"/>
           </a:p>
           <a:p>
@@ -5609,10 +6021,14 @@
               </a:lnSpc>
             </a:pPr>
             <a:r>
-              <a:rPr lang="en-US" altLang="en-US" b="1"/>
-              <a:t>The various classes Tracker, Peer, PieceManager have been written.</a:t>
-            </a:r>
-            <a:endParaRPr lang="en-US" altLang="en-US" b="1"/>
+              <a:rPr lang="en-US" altLang="en-US" b="1">
+                <a:sym typeface="+mn-ea"/>
+              </a:rPr>
+              <a:t>6. If an entire piece is received, we hash it and check it with the HASH in the torrent, if it is matching, we write to disk.</a:t>
+            </a:r>
+            <a:endParaRPr lang="en-US" altLang="en-US" b="1">
+              <a:sym typeface="+mn-ea"/>
+            </a:endParaRPr>
           </a:p>
           <a:p>
             <a:pPr algn="l">
@@ -5620,11 +6036,9 @@
                 <a:spcPct val="130000"/>
               </a:lnSpc>
             </a:pPr>
-            <a:r>
-              <a:rPr lang="en-US" altLang="en-US" b="1" u="sng"/>
-              <a:t>The entire program is a concurrent program, implemented in asyncio(will be explained at the demo part)</a:t>
-            </a:r>
-            <a:endParaRPr lang="en-US" altLang="en-US" b="1" u="sng"/>
+            <a:endParaRPr lang="en-US" altLang="en-US" b="1">
+              <a:sym typeface="+mn-ea"/>
+            </a:endParaRPr>
           </a:p>
           <a:p>
             <a:pPr algn="l">
@@ -5632,10 +6046,6 @@
                 <a:spcPct val="130000"/>
               </a:lnSpc>
             </a:pPr>
-            <a:r>
-              <a:rPr lang="en-US" altLang="en-US" b="1"/>
-              <a:t>Both single file and multi file torrents are handled, file writing is also asynchronous.</a:t>
-            </a:r>
             <a:endParaRPr lang="en-US" altLang="en-US" b="1"/>
           </a:p>
           <a:p>
@@ -5645,9 +6055,35 @@
               </a:lnSpc>
             </a:pPr>
             <a:r>
-              <a:rPr lang="en-US" altLang="en-US" b="1"/>
-              <a:t>Both HTTP and UDP trackers are implemented. </a:t>
-            </a:r>
+              <a:rPr lang="en-US" altLang="en-US" b="1">
+                <a:sym typeface="+mn-ea"/>
+              </a:rPr>
+              <a:t>7. When we have atleast one piece, we are ready to serve other clients(uploading/seeding)</a:t>
+            </a:r>
+            <a:endParaRPr lang="en-US" altLang="en-US" b="1"/>
+          </a:p>
+          <a:p>
+            <a:pPr algn="l">
+              <a:lnSpc>
+                <a:spcPct val="160000"/>
+              </a:lnSpc>
+            </a:pPr>
+            <a:endParaRPr lang="en-US" altLang="en-US" b="1"/>
+          </a:p>
+          <a:p>
+            <a:pPr algn="l">
+              <a:lnSpc>
+                <a:spcPct val="130000"/>
+              </a:lnSpc>
+            </a:pPr>
+            <a:endParaRPr lang="en-US" altLang="en-US" b="1"/>
+          </a:p>
+          <a:p>
+            <a:pPr algn="l">
+              <a:lnSpc>
+                <a:spcPct val="160000"/>
+              </a:lnSpc>
+            </a:pPr>
             <a:endParaRPr lang="en-US" altLang="en-US" b="1"/>
           </a:p>
         </p:txBody>
@@ -5748,7 +6184,7 @@
         <p:spPr/>
         <p:txBody>
           <a:bodyPr>
-            <a:normAutofit fontScale="90000"/>
+            <a:normAutofit/>
           </a:bodyPr>
           <a:p>
             <a:pPr algn="ctr"/>
@@ -5757,12 +6193,94 @@
                 <a:latin typeface="Gubbi" panose="00000400000000000000" charset="0"/>
                 <a:cs typeface="Gubbi" panose="00000400000000000000" charset="0"/>
               </a:rPr>
-              <a:t>WALK-THROUGH OF THE IMPLEMENTATION</a:t>
+              <a:t>CHALLENGES AND INTRICACIES</a:t>
             </a:r>
             <a:endParaRPr lang="en-US" altLang="en-US" sz="4000">
               <a:latin typeface="Gubbi" panose="00000400000000000000" charset="0"/>
               <a:cs typeface="Gubbi" panose="00000400000000000000" charset="0"/>
             </a:endParaRPr>
+          </a:p>
+        </p:txBody>
+      </p:sp>
+      <p:sp>
+        <p:nvSpPr>
+          <p:cNvPr id="6" name="Content Placeholder 5"/>
+          <p:cNvSpPr>
+            <a:spLocks noGrp="1"/>
+          </p:cNvSpPr>
+          <p:nvPr>
+            <p:ph idx="1"/>
+          </p:nvPr>
+        </p:nvSpPr>
+        <p:spPr>
+          <a:xfrm>
+            <a:off x="647700" y="1081405"/>
+            <a:ext cx="10515600" cy="4934585"/>
+          </a:xfrm>
+        </p:spPr>
+        <p:txBody>
+          <a:bodyPr>
+            <a:normAutofit lnSpcReduction="20000"/>
+          </a:bodyPr>
+          <a:p>
+            <a:pPr algn="l"/>
+            <a:endParaRPr lang="en-US" altLang="en-US" b="1"/>
+          </a:p>
+          <a:p>
+            <a:pPr algn="l">
+              <a:lnSpc>
+                <a:spcPct val="130000"/>
+              </a:lnSpc>
+            </a:pPr>
+            <a:r>
+              <a:rPr lang="en-US" altLang="en-US" b="1"/>
+              <a:t>One challenge is to have peer connections to be concurrent.</a:t>
+            </a:r>
+            <a:endParaRPr lang="en-US" altLang="en-US" b="1"/>
+          </a:p>
+          <a:p>
+            <a:pPr algn="l">
+              <a:lnSpc>
+                <a:spcPct val="130000"/>
+              </a:lnSpc>
+            </a:pPr>
+            <a:endParaRPr lang="en-US" altLang="en-US" b="1"/>
+          </a:p>
+          <a:p>
+            <a:pPr algn="l">
+              <a:lnSpc>
+                <a:spcPct val="130000"/>
+              </a:lnSpc>
+            </a:pPr>
+            <a:endParaRPr lang="en-US" altLang="en-US" b="1"/>
+          </a:p>
+          <a:p>
+            <a:pPr algn="l">
+              <a:lnSpc>
+                <a:spcPct val="130000"/>
+              </a:lnSpc>
+            </a:pPr>
+            <a:endParaRPr lang="en-US" altLang="en-US" b="1"/>
+          </a:p>
+          <a:p>
+            <a:pPr algn="l">
+              <a:lnSpc>
+                <a:spcPct val="130000"/>
+              </a:lnSpc>
+            </a:pPr>
+            <a:r>
+              <a:rPr lang="en-US" altLang="en-US" b="1"/>
+              <a:t>Optimize which piece to ask the peer, based on its bitfield.(Here, the piece by order is used)</a:t>
+            </a:r>
+            <a:endParaRPr lang="en-US" altLang="en-US" b="1"/>
+          </a:p>
+          <a:p>
+            <a:pPr algn="l">
+              <a:lnSpc>
+                <a:spcPct val="130000"/>
+              </a:lnSpc>
+            </a:pPr>
+            <a:endParaRPr lang="en-US" altLang="en-US" b="1"/>
           </a:p>
         </p:txBody>
       </p:sp>
@@ -5828,152 +6346,6 @@
               <a:latin typeface="Arial" panose="020B0604020202020204" pitchFamily="34" charset="0"/>
               <a:cs typeface="Arial" panose="020B0604020202020204" pitchFamily="34" charset="0"/>
             </a:endParaRPr>
-          </a:p>
-        </p:txBody>
-      </p:sp>
-      <p:sp>
-        <p:nvSpPr>
-          <p:cNvPr id="2" name="Content Placeholder 1"/>
-          <p:cNvSpPr/>
-          <p:nvPr>
-            <p:ph idx="1"/>
-          </p:nvPr>
-        </p:nvSpPr>
-        <p:spPr>
-          <a:xfrm>
-            <a:off x="647700" y="1393825"/>
-            <a:ext cx="10515600" cy="5038725"/>
-          </a:xfrm>
-        </p:spPr>
-        <p:txBody>
-          <a:bodyPr>
-            <a:normAutofit lnSpcReduction="10000"/>
-          </a:bodyPr>
-          <a:p>
-            <a:r>
-              <a:rPr lang="" altLang="en-US" b="1"/>
-              <a:t>Total lines of code - 1350</a:t>
-            </a:r>
-            <a:endParaRPr lang="" altLang="en-US" b="1"/>
-          </a:p>
-          <a:p>
-            <a:r>
-              <a:rPr lang="" altLang="en-US" b="1"/>
-              <a:t>Split into 6 files(each file represents a concept in the form of many classes)</a:t>
-            </a:r>
-            <a:endParaRPr lang="" altLang="en-US" b="1"/>
-          </a:p>
-          <a:p>
-            <a:pPr marL="0" indent="0">
-              <a:lnSpc>
-                <a:spcPct val="120000"/>
-              </a:lnSpc>
-              <a:buNone/>
-            </a:pPr>
-            <a:r>
-              <a:rPr lang="" altLang="en-US" b="1"/>
-              <a:t>1. </a:t>
-            </a:r>
-            <a:r>
-              <a:rPr lang="" altLang="en-US" b="1" u="sng"/>
-              <a:t>own_bencoding.py</a:t>
-            </a:r>
-            <a:r>
-              <a:rPr lang="" altLang="en-US" b="1"/>
-              <a:t> - Contains classes Encoder and Decoder for bencoding and bdecoding respectively</a:t>
-            </a:r>
-            <a:endParaRPr lang="" altLang="en-US" b="1"/>
-          </a:p>
-          <a:p>
-            <a:pPr marL="0" indent="0">
-              <a:buNone/>
-            </a:pPr>
-            <a:r>
-              <a:rPr lang="" altLang="en-US" b="1"/>
-              <a:t>2. </a:t>
-            </a:r>
-            <a:r>
-              <a:rPr lang="" altLang="en-US" b="1" u="sng"/>
-              <a:t>tracker.py</a:t>
-            </a:r>
-            <a:r>
-              <a:rPr lang="" altLang="en-US" b="1"/>
-              <a:t> - Contains tracker class</a:t>
-            </a:r>
-            <a:endParaRPr lang="" altLang="en-US" b="1"/>
-          </a:p>
-          <a:p>
-            <a:pPr marL="0" indent="0">
-              <a:lnSpc>
-                <a:spcPct val="120000"/>
-              </a:lnSpc>
-              <a:buNone/>
-            </a:pPr>
-            <a:r>
-              <a:rPr lang="" altLang="en-US" b="1"/>
-              <a:t>3. </a:t>
-            </a:r>
-            <a:r>
-              <a:rPr lang="" altLang="en-US" b="1" u="sng"/>
-              <a:t>peer.py</a:t>
-            </a:r>
-            <a:r>
-              <a:rPr lang="" altLang="en-US" b="1"/>
-              <a:t> - Contains PeerConnection classes and a global PeerStreamIterator class for iterating through the stream(socket stream) of a single peer</a:t>
-            </a:r>
-            <a:endParaRPr lang="" altLang="en-US" b="1"/>
-          </a:p>
-          <a:p>
-            <a:pPr marL="0" indent="0">
-              <a:buNone/>
-            </a:pPr>
-            <a:r>
-              <a:rPr lang="" altLang="en-US" b="1"/>
-              <a:t>4. </a:t>
-            </a:r>
-            <a:r>
-              <a:rPr lang="" altLang="en-US" b="1" u="sng"/>
-              <a:t>piece_manager.py</a:t>
-            </a:r>
-            <a:r>
-              <a:rPr lang="" altLang="en-US" b="1"/>
-              <a:t> - Contains the classes PieceManager, Piece and Block.</a:t>
-            </a:r>
-            <a:endParaRPr lang="" altLang="en-US" b="1"/>
-          </a:p>
-          <a:p>
-            <a:pPr marL="0" indent="0">
-              <a:lnSpc>
-                <a:spcPct val="110000"/>
-              </a:lnSpc>
-              <a:buNone/>
-            </a:pPr>
-            <a:r>
-              <a:rPr lang="" altLang="en-US" b="1"/>
-              <a:t>5. </a:t>
-            </a:r>
-            <a:r>
-              <a:rPr lang="" altLang="en-US" b="1" u="sng"/>
-              <a:t>protocol.py</a:t>
-            </a:r>
-            <a:r>
-              <a:rPr lang="" altLang="en-US" b="1"/>
-              <a:t> - contains a class with the encoding and decoding algorithm for every type of message which can be sent/received.</a:t>
-            </a:r>
-            <a:endParaRPr lang="" altLang="en-US" b="1"/>
-          </a:p>
-          <a:p>
-            <a:pPr marL="0" indent="0">
-              <a:lnSpc>
-                <a:spcPct val="120000"/>
-              </a:lnSpc>
-              <a:buNone/>
-            </a:pPr>
-            <a:r>
-              <a:rPr lang="" altLang="en-US" b="1"/>
-              <a:t>6. async_client.py - the torrent client which runs the torrent, by directly/indirectly incorporating the above classes.</a:t>
-            </a:r>
-            <a:endParaRPr lang="" altLang="en-US" b="1"/>
           </a:p>
         </p:txBody>
       </p:sp>
@@ -6017,12 +6389,132 @@
                 <a:latin typeface="Gubbi" panose="00000400000000000000" charset="0"/>
                 <a:cs typeface="Gubbi" panose="00000400000000000000" charset="0"/>
               </a:rPr>
-              <a:t>DEMO</a:t>
+              <a:t>CHALLENGES AND INTRICACIES</a:t>
             </a:r>
             <a:endParaRPr lang="en-US" altLang="en-US" sz="4000">
               <a:latin typeface="Gubbi" panose="00000400000000000000" charset="0"/>
               <a:cs typeface="Gubbi" panose="00000400000000000000" charset="0"/>
             </a:endParaRPr>
+          </a:p>
+        </p:txBody>
+      </p:sp>
+      <p:sp>
+        <p:nvSpPr>
+          <p:cNvPr id="6" name="Content Placeholder 5"/>
+          <p:cNvSpPr>
+            <a:spLocks noGrp="1"/>
+          </p:cNvSpPr>
+          <p:nvPr>
+            <p:ph idx="1"/>
+          </p:nvPr>
+        </p:nvSpPr>
+        <p:spPr>
+          <a:xfrm>
+            <a:off x="647700" y="1081405"/>
+            <a:ext cx="10515600" cy="4934585"/>
+          </a:xfrm>
+        </p:spPr>
+        <p:txBody>
+          <a:bodyPr>
+            <a:normAutofit lnSpcReduction="20000"/>
+          </a:bodyPr>
+          <a:p>
+            <a:pPr algn="l"/>
+            <a:endParaRPr lang="en-US" altLang="en-US" b="1"/>
+          </a:p>
+          <a:p>
+            <a:pPr algn="l">
+              <a:lnSpc>
+                <a:spcPct val="130000"/>
+              </a:lnSpc>
+            </a:pPr>
+            <a:r>
+              <a:rPr lang="en-US" altLang="en-US" b="1">
+                <a:sym typeface="+mn-ea"/>
+              </a:rPr>
+              <a:t>Difficulty in managing sockets - the messages are not sent as a single message.</a:t>
+            </a:r>
+            <a:endParaRPr lang="en-US" altLang="en-US" b="1">
+              <a:sym typeface="+mn-ea"/>
+            </a:endParaRPr>
+          </a:p>
+          <a:p>
+            <a:pPr algn="l">
+              <a:lnSpc>
+                <a:spcPct val="130000"/>
+              </a:lnSpc>
+            </a:pPr>
+            <a:endParaRPr lang="en-US" altLang="en-US" b="1">
+              <a:sym typeface="+mn-ea"/>
+            </a:endParaRPr>
+          </a:p>
+          <a:p>
+            <a:pPr algn="l">
+              <a:lnSpc>
+                <a:spcPct val="130000"/>
+              </a:lnSpc>
+            </a:pPr>
+            <a:endParaRPr lang="en-US" altLang="en-US" b="1">
+              <a:sym typeface="+mn-ea"/>
+            </a:endParaRPr>
+          </a:p>
+          <a:p>
+            <a:pPr algn="l">
+              <a:lnSpc>
+                <a:spcPct val="130000"/>
+              </a:lnSpc>
+            </a:pPr>
+            <a:endParaRPr lang="en-US" altLang="en-US" b="1">
+              <a:sym typeface="+mn-ea"/>
+            </a:endParaRPr>
+          </a:p>
+          <a:p>
+            <a:pPr algn="l">
+              <a:lnSpc>
+                <a:spcPct val="130000"/>
+              </a:lnSpc>
+            </a:pPr>
+            <a:endParaRPr lang="en-US" altLang="en-US" b="1"/>
+          </a:p>
+          <a:p>
+            <a:pPr algn="l">
+              <a:lnSpc>
+                <a:spcPct val="130000"/>
+              </a:lnSpc>
+            </a:pPr>
+            <a:r>
+              <a:rPr lang="en-US" altLang="en-US" b="1" u="sng">
+                <a:sym typeface="+mn-ea"/>
+              </a:rPr>
+              <a:t>They can be send part-by-part, so we have to buffer the messages until we get something of meaning.</a:t>
+            </a:r>
+            <a:endParaRPr lang="en-US" altLang="en-US" b="1" u="sng">
+              <a:sym typeface="+mn-ea"/>
+            </a:endParaRPr>
+          </a:p>
+          <a:p>
+            <a:pPr algn="l">
+              <a:lnSpc>
+                <a:spcPct val="130000"/>
+              </a:lnSpc>
+            </a:pPr>
+            <a:endParaRPr lang="en-US" altLang="en-US" b="1"/>
+          </a:p>
+          <a:p>
+            <a:pPr algn="l">
+              <a:lnSpc>
+                <a:spcPct val="130000"/>
+              </a:lnSpc>
+            </a:pPr>
+            <a:endParaRPr lang="en-US" altLang="en-US" b="1"/>
+          </a:p>
+          <a:p>
+            <a:pPr algn="l">
+              <a:lnSpc>
+                <a:spcPct val="130000"/>
+              </a:lnSpc>
+            </a:pPr>
+            <a:endParaRPr lang="en-US" altLang="en-US" b="1"/>
           </a:p>
         </p:txBody>
       </p:sp>
@@ -6088,39 +6580,6 @@
               <a:latin typeface="Arial" panose="020B0604020202020204" pitchFamily="34" charset="0"/>
               <a:cs typeface="Arial" panose="020B0604020202020204" pitchFamily="34" charset="0"/>
             </a:endParaRPr>
-          </a:p>
-        </p:txBody>
-      </p:sp>
-      <p:sp>
-        <p:nvSpPr>
-          <p:cNvPr id="2" name="Content Placeholder 1"/>
-          <p:cNvSpPr/>
-          <p:nvPr>
-            <p:ph idx="1"/>
-          </p:nvPr>
-        </p:nvSpPr>
-        <p:spPr/>
-        <p:txBody>
-          <a:bodyPr/>
-          <a:p>
-            <a:endParaRPr lang="en-US" altLang="en-US" b="1"/>
-          </a:p>
-          <a:p>
-            <a:r>
-              <a:rPr lang="en-US" altLang="en-US" b="1"/>
-              <a:t>Run the program</a:t>
-            </a:r>
-            <a:endParaRPr lang="en-US" altLang="en-US" b="1"/>
-          </a:p>
-          <a:p>
-            <a:endParaRPr lang="en-US" altLang="en-US" b="1"/>
-          </a:p>
-          <a:p>
-            <a:r>
-              <a:rPr lang="en-US" altLang="en-US" b="1"/>
-              <a:t>Wireshark - capture BitTorrent packets and explain.</a:t>
-            </a:r>
-            <a:endParaRPr lang="en-US" altLang="en-US" b="1"/>
           </a:p>
         </p:txBody>
       </p:sp>
@@ -6164,12 +6623,138 @@
                 <a:latin typeface="Gubbi" panose="00000400000000000000" charset="0"/>
                 <a:cs typeface="Gubbi" panose="00000400000000000000" charset="0"/>
               </a:rPr>
-              <a:t>LEARNING CURVE</a:t>
+              <a:t>CHALLENGES AND INTRICACIES</a:t>
             </a:r>
             <a:endParaRPr lang="en-US" altLang="en-US" sz="4000">
               <a:latin typeface="Gubbi" panose="00000400000000000000" charset="0"/>
               <a:cs typeface="Gubbi" panose="00000400000000000000" charset="0"/>
             </a:endParaRPr>
+          </a:p>
+        </p:txBody>
+      </p:sp>
+      <p:sp>
+        <p:nvSpPr>
+          <p:cNvPr id="6" name="Content Placeholder 5"/>
+          <p:cNvSpPr>
+            <a:spLocks noGrp="1"/>
+          </p:cNvSpPr>
+          <p:nvPr>
+            <p:ph idx="1"/>
+          </p:nvPr>
+        </p:nvSpPr>
+        <p:spPr>
+          <a:xfrm>
+            <a:off x="647700" y="1081405"/>
+            <a:ext cx="10515600" cy="4934585"/>
+          </a:xfrm>
+        </p:spPr>
+        <p:txBody>
+          <a:bodyPr>
+            <a:normAutofit lnSpcReduction="20000"/>
+          </a:bodyPr>
+          <a:p>
+            <a:pPr algn="l">
+              <a:lnSpc>
+                <a:spcPct val="130000"/>
+              </a:lnSpc>
+            </a:pPr>
+            <a:r>
+              <a:rPr lang="en-US" altLang="en-US" b="1" u="sng">
+                <a:sym typeface="+mn-ea"/>
+              </a:rPr>
+              <a:t>Or many messages can be sent together, so we have to properly decode every message and make sure nothing is lost.</a:t>
+            </a:r>
+            <a:endParaRPr lang="en-US" altLang="en-US" b="1" u="sng">
+              <a:sym typeface="+mn-ea"/>
+            </a:endParaRPr>
+          </a:p>
+          <a:p>
+            <a:pPr algn="l">
+              <a:lnSpc>
+                <a:spcPct val="130000"/>
+              </a:lnSpc>
+            </a:pPr>
+            <a:endParaRPr lang="en-US" altLang="en-US" b="1" u="sng">
+              <a:sym typeface="+mn-ea"/>
+            </a:endParaRPr>
+          </a:p>
+          <a:p>
+            <a:pPr algn="l">
+              <a:lnSpc>
+                <a:spcPct val="130000"/>
+              </a:lnSpc>
+            </a:pPr>
+            <a:endParaRPr lang="en-US" altLang="en-US" b="1" u="sng">
+              <a:sym typeface="+mn-ea"/>
+            </a:endParaRPr>
+          </a:p>
+          <a:p>
+            <a:pPr algn="l">
+              <a:lnSpc>
+                <a:spcPct val="130000"/>
+              </a:lnSpc>
+            </a:pPr>
+            <a:endParaRPr lang="en-US" altLang="en-US" b="1" u="sng">
+              <a:sym typeface="+mn-ea"/>
+            </a:endParaRPr>
+          </a:p>
+          <a:p>
+            <a:pPr algn="l">
+              <a:lnSpc>
+                <a:spcPct val="130000"/>
+              </a:lnSpc>
+            </a:pPr>
+            <a:endParaRPr lang="en-US" altLang="en-US" b="1" u="sng">
+              <a:sym typeface="+mn-ea"/>
+            </a:endParaRPr>
+          </a:p>
+          <a:p>
+            <a:pPr algn="l">
+              <a:lnSpc>
+                <a:spcPct val="130000"/>
+              </a:lnSpc>
+            </a:pPr>
+            <a:endParaRPr lang="en-US" altLang="en-US" b="1" u="sng">
+              <a:sym typeface="+mn-ea"/>
+            </a:endParaRPr>
+          </a:p>
+          <a:p>
+            <a:pPr algn="l">
+              <a:lnSpc>
+                <a:spcPct val="130000"/>
+              </a:lnSpc>
+            </a:pPr>
+            <a:endParaRPr lang="en-US" altLang="en-US" b="1"/>
+          </a:p>
+          <a:p>
+            <a:pPr algn="l">
+              <a:lnSpc>
+                <a:spcPct val="160000"/>
+              </a:lnSpc>
+            </a:pPr>
+            <a:r>
+              <a:rPr lang="en-US" altLang="en-US" b="1">
+                <a:sym typeface="+mn-ea"/>
+              </a:rPr>
+              <a:t>Optimize the peers obtained - worst case - all peers are inactive - we have to make sure we request the tracker again, and get peers.</a:t>
+            </a:r>
+            <a:endParaRPr lang="en-US" altLang="en-US" b="1"/>
+          </a:p>
+          <a:p>
+            <a:pPr algn="l">
+              <a:lnSpc>
+                <a:spcPct val="130000"/>
+              </a:lnSpc>
+            </a:pPr>
+            <a:endParaRPr lang="en-US" altLang="en-US" b="1"/>
+          </a:p>
+          <a:p>
+            <a:pPr algn="l">
+              <a:lnSpc>
+                <a:spcPct val="130000"/>
+              </a:lnSpc>
+            </a:pPr>
+            <a:endParaRPr lang="en-US" altLang="en-US" b="1"/>
           </a:p>
         </p:txBody>
       </p:sp>
@@ -6235,99 +6820,6 @@
               <a:latin typeface="Arial" panose="020B0604020202020204" pitchFamily="34" charset="0"/>
               <a:cs typeface="Arial" panose="020B0604020202020204" pitchFamily="34" charset="0"/>
             </a:endParaRPr>
-          </a:p>
-        </p:txBody>
-      </p:sp>
-      <p:sp>
-        <p:nvSpPr>
-          <p:cNvPr id="2" name="Content Placeholder 1"/>
-          <p:cNvSpPr/>
-          <p:nvPr>
-            <p:ph idx="1"/>
-          </p:nvPr>
-        </p:nvSpPr>
-        <p:spPr/>
-        <p:txBody>
-          <a:bodyPr/>
-          <a:p>
-            <a:pPr>
-              <a:lnSpc>
-                <a:spcPct val="130000"/>
-              </a:lnSpc>
-            </a:pPr>
-            <a:r>
-              <a:rPr lang="en-US" altLang="en-US" b="1"/>
-              <a:t>Understood how the BitTorrent protocol works in detail, and now can </a:t>
-            </a:r>
-            <a:r>
-              <a:rPr lang="" altLang="en-US" b="1"/>
-              <a:t>scale </a:t>
-            </a:r>
-            <a:r>
-              <a:rPr lang="en-US" altLang="en-US" b="1"/>
-              <a:t>the program using various revisions of the protocol to match big-time BitTorrent clients such as Transmission, UTtorrent. </a:t>
-            </a:r>
-            <a:endParaRPr lang="en-US" altLang="en-US" b="1"/>
-          </a:p>
-          <a:p>
-            <a:pPr>
-              <a:lnSpc>
-                <a:spcPct val="130000"/>
-              </a:lnSpc>
-            </a:pPr>
-            <a:r>
-              <a:rPr lang="en-US" altLang="en-US" b="1"/>
-              <a:t>Implemented TCP sockets </a:t>
-            </a:r>
-            <a:r>
-              <a:rPr lang="en-US" altLang="en-US" b="1" u="sng"/>
-              <a:t>asynchronously</a:t>
-            </a:r>
-            <a:r>
-              <a:rPr lang="en-US" altLang="en-US" b="1"/>
-              <a:t>, and learnt how to continously get data and decode it properly.</a:t>
-            </a:r>
-            <a:endParaRPr lang="en-US" altLang="en-US" b="1"/>
-          </a:p>
-          <a:p>
-            <a:pPr>
-              <a:lnSpc>
-                <a:spcPct val="130000"/>
-              </a:lnSpc>
-            </a:pPr>
-            <a:r>
-              <a:rPr lang="en-US" altLang="en-US" b="1"/>
-              <a:t>Learn how to work with HTTP and UDP trackers </a:t>
-            </a:r>
-            <a:r>
-              <a:rPr lang="en-US" altLang="en-US" b="1" u="sng"/>
-              <a:t>asynchronously</a:t>
-            </a:r>
-            <a:r>
-              <a:rPr lang="en-US" altLang="en-US" b="1"/>
-              <a:t>.</a:t>
-            </a:r>
-            <a:endParaRPr lang="en-US" altLang="en-US" b="1"/>
-          </a:p>
-          <a:p>
-            <a:pPr>
-              <a:lnSpc>
-                <a:spcPct val="130000"/>
-              </a:lnSpc>
-            </a:pPr>
-            <a:r>
-              <a:rPr lang="en-US" altLang="en-US" b="1"/>
-              <a:t>Learnt how to debug the mistakes in the implementation using Wireshark to monitor packets and figure out what’s wrong.</a:t>
-            </a:r>
-            <a:endParaRPr lang="en-US" altLang="en-US" b="1"/>
-          </a:p>
-          <a:p>
-            <a:pPr>
-              <a:lnSpc>
-                <a:spcPct val="130000"/>
-              </a:lnSpc>
-            </a:pPr>
-            <a:endParaRPr lang="en-US" altLang="en-US" b="1"/>
           </a:p>
         </p:txBody>
       </p:sp>
@@ -6367,16 +6859,122 @@
           <a:p>
             <a:pPr algn="ctr"/>
             <a:r>
-              <a:rPr lang="" altLang="en-US" sz="4000">
+              <a:rPr lang="en-US" altLang="en-US" sz="4000">
                 <a:latin typeface="Gubbi" panose="00000400000000000000" charset="0"/>
                 <a:cs typeface="Gubbi" panose="00000400000000000000" charset="0"/>
               </a:rPr>
-              <a:t>INSTRUCTIONS TO EXECUTE THE CODE</a:t>
-            </a:r>
-            <a:endParaRPr lang="" altLang="en-US" sz="4000">
+              <a:t>IMPLEMENTATION</a:t>
+            </a:r>
+            <a:endParaRPr lang="en-US" altLang="en-US" sz="4000">
               <a:latin typeface="Gubbi" panose="00000400000000000000" charset="0"/>
               <a:cs typeface="Gubbi" panose="00000400000000000000" charset="0"/>
             </a:endParaRPr>
+          </a:p>
+        </p:txBody>
+      </p:sp>
+      <p:sp>
+        <p:nvSpPr>
+          <p:cNvPr id="6" name="Content Placeholder 5"/>
+          <p:cNvSpPr>
+            <a:spLocks noGrp="1"/>
+          </p:cNvSpPr>
+          <p:nvPr>
+            <p:ph idx="1"/>
+          </p:nvPr>
+        </p:nvSpPr>
+        <p:spPr>
+          <a:xfrm>
+            <a:off x="647700" y="1081405"/>
+            <a:ext cx="10515600" cy="4934585"/>
+          </a:xfrm>
+        </p:spPr>
+        <p:txBody>
+          <a:bodyPr>
+            <a:normAutofit lnSpcReduction="20000"/>
+          </a:bodyPr>
+          <a:p>
+            <a:pPr algn="l"/>
+            <a:endParaRPr lang="en-US" altLang="en-US" b="1"/>
+          </a:p>
+          <a:p>
+            <a:pPr algn="l"/>
+            <a:endParaRPr lang="en-US" altLang="en-US" b="1"/>
+          </a:p>
+          <a:p>
+            <a:pPr algn="l">
+              <a:lnSpc>
+                <a:spcPct val="140000"/>
+              </a:lnSpc>
+            </a:pPr>
+            <a:r>
+              <a:rPr lang="en-US" altLang="en-US" b="1"/>
+              <a:t>The implementation of the BitTorrent client(the torrent downloader) has been done in Python 3.7</a:t>
+            </a:r>
+            <a:endParaRPr lang="en-US" altLang="en-US" b="1"/>
+          </a:p>
+          <a:p>
+            <a:pPr algn="l">
+              <a:lnSpc>
+                <a:spcPct val="140000"/>
+              </a:lnSpc>
+            </a:pPr>
+            <a:endParaRPr lang="en-US" altLang="en-US" b="1"/>
+          </a:p>
+          <a:p>
+            <a:pPr algn="l">
+              <a:lnSpc>
+                <a:spcPct val="140000"/>
+              </a:lnSpc>
+            </a:pPr>
+            <a:endParaRPr lang="en-US" altLang="en-US" b="1"/>
+          </a:p>
+          <a:p>
+            <a:pPr algn="l">
+              <a:lnSpc>
+                <a:spcPct val="130000"/>
+              </a:lnSpc>
+            </a:pPr>
+            <a:r>
+              <a:rPr lang="en-US" altLang="en-US" b="1"/>
+              <a:t>The bencoding library has been written from scratch, to understand how this basic encoding and decoding works.</a:t>
+            </a:r>
+            <a:endParaRPr lang="en-US" altLang="en-US" b="1"/>
+          </a:p>
+          <a:p>
+            <a:pPr algn="l">
+              <a:lnSpc>
+                <a:spcPct val="130000"/>
+              </a:lnSpc>
+            </a:pPr>
+            <a:endParaRPr lang="en-US" altLang="en-US" b="1"/>
+          </a:p>
+          <a:p>
+            <a:pPr algn="l">
+              <a:lnSpc>
+                <a:spcPct val="130000"/>
+              </a:lnSpc>
+            </a:pPr>
+            <a:endParaRPr lang="en-US" altLang="en-US" b="1"/>
+          </a:p>
+          <a:p>
+            <a:pPr algn="l">
+              <a:lnSpc>
+                <a:spcPct val="130000"/>
+              </a:lnSpc>
+            </a:pPr>
+            <a:r>
+              <a:rPr lang="en-US" altLang="en-US" b="1"/>
+              <a:t>The various classes Tracker, Peer, PieceManager have been written.</a:t>
+            </a:r>
+            <a:endParaRPr lang="en-US" altLang="en-US" b="1"/>
+          </a:p>
+          <a:p>
+            <a:pPr algn="l">
+              <a:lnSpc>
+                <a:spcPct val="130000"/>
+              </a:lnSpc>
+            </a:pPr>
+            <a:endParaRPr lang="en-US" altLang="en-US" b="1"/>
           </a:p>
         </p:txBody>
       </p:sp>
@@ -6442,63 +7040,6 @@
               <a:latin typeface="Arial" panose="020B0604020202020204" pitchFamily="34" charset="0"/>
               <a:cs typeface="Arial" panose="020B0604020202020204" pitchFamily="34" charset="0"/>
             </a:endParaRPr>
-          </a:p>
-        </p:txBody>
-      </p:sp>
-      <p:sp>
-        <p:nvSpPr>
-          <p:cNvPr id="2" name="Content Placeholder 1"/>
-          <p:cNvSpPr/>
-          <p:nvPr>
-            <p:ph idx="1"/>
-          </p:nvPr>
-        </p:nvSpPr>
-        <p:spPr/>
-        <p:txBody>
-          <a:bodyPr/>
-          <a:p>
-            <a:pPr>
-              <a:lnSpc>
-                <a:spcPct val="130000"/>
-              </a:lnSpc>
-            </a:pPr>
-            <a:r>
-              <a:rPr lang="" altLang="en-US" b="1"/>
-              <a:t>Download and unzip 18PW03_code.zip from the google drive folder.</a:t>
-            </a:r>
-            <a:endParaRPr lang="" altLang="en-US" b="1"/>
-          </a:p>
-          <a:p>
-            <a:pPr>
-              <a:lnSpc>
-                <a:spcPct val="130000"/>
-              </a:lnSpc>
-            </a:pPr>
-            <a:r>
-              <a:rPr lang="" altLang="en-US" b="1"/>
-              <a:t>You will see 3 folders and 2 files.</a:t>
-            </a:r>
-            <a:endParaRPr lang="" altLang="en-US" b="1"/>
-          </a:p>
-          <a:p>
-            <a:pPr>
-              <a:lnSpc>
-                <a:spcPct val="130000"/>
-              </a:lnSpc>
-            </a:pPr>
-            <a:r>
-              <a:rPr lang="" altLang="en-US" b="1"/>
-              <a:t>The README.txt file contains further instructions to compile the code and run it.</a:t>
-            </a:r>
-            <a:endParaRPr lang="en-US" altLang="en-US" b="1"/>
-          </a:p>
-          <a:p>
-            <a:pPr>
-              <a:lnSpc>
-                <a:spcPct val="130000"/>
-              </a:lnSpc>
-            </a:pPr>
-            <a:endParaRPr lang="en-US" altLang="en-US" b="1"/>
           </a:p>
         </p:txBody>
       </p:sp>
@@ -6530,12 +7071,7 @@
             <p:ph type="title"/>
           </p:nvPr>
         </p:nvSpPr>
-        <p:spPr>
-          <a:xfrm>
-            <a:off x="647700" y="2574290"/>
-            <a:ext cx="10515600" cy="1325563"/>
-          </a:xfrm>
-        </p:spPr>
+        <p:spPr/>
         <p:txBody>
           <a:bodyPr>
             <a:normAutofit/>
@@ -6547,12 +7083,128 @@
                 <a:latin typeface="Gubbi" panose="00000400000000000000" charset="0"/>
                 <a:cs typeface="Gubbi" panose="00000400000000000000" charset="0"/>
               </a:rPr>
-              <a:t>THANK YOU!</a:t>
+              <a:t>IMPLEMENTATION</a:t>
             </a:r>
             <a:endParaRPr lang="en-US" altLang="en-US" sz="4000">
               <a:latin typeface="Gubbi" panose="00000400000000000000" charset="0"/>
               <a:cs typeface="Gubbi" panose="00000400000000000000" charset="0"/>
             </a:endParaRPr>
+          </a:p>
+        </p:txBody>
+      </p:sp>
+      <p:sp>
+        <p:nvSpPr>
+          <p:cNvPr id="6" name="Content Placeholder 5"/>
+          <p:cNvSpPr>
+            <a:spLocks noGrp="1"/>
+          </p:cNvSpPr>
+          <p:nvPr>
+            <p:ph idx="1"/>
+          </p:nvPr>
+        </p:nvSpPr>
+        <p:spPr>
+          <a:xfrm>
+            <a:off x="647700" y="1081405"/>
+            <a:ext cx="10515600" cy="4934585"/>
+          </a:xfrm>
+        </p:spPr>
+        <p:txBody>
+          <a:bodyPr>
+            <a:normAutofit lnSpcReduction="20000"/>
+          </a:bodyPr>
+          <a:p>
+            <a:pPr algn="l"/>
+            <a:endParaRPr lang="en-US" altLang="en-US" b="1"/>
+          </a:p>
+          <a:p>
+            <a:pPr algn="l">
+              <a:lnSpc>
+                <a:spcPct val="130000"/>
+              </a:lnSpc>
+            </a:pPr>
+            <a:r>
+              <a:rPr lang="en-US" altLang="en-US" b="1" u="sng">
+                <a:sym typeface="+mn-ea"/>
+              </a:rPr>
+              <a:t>The entire program is a concurrent program, implemented in asyncio(will be explained at the demo part)</a:t>
+            </a:r>
+            <a:endParaRPr lang="en-US" altLang="en-US" b="1" u="sng">
+              <a:sym typeface="+mn-ea"/>
+            </a:endParaRPr>
+          </a:p>
+          <a:p>
+            <a:pPr algn="l">
+              <a:lnSpc>
+                <a:spcPct val="130000"/>
+              </a:lnSpc>
+            </a:pPr>
+            <a:endParaRPr lang="en-US" altLang="en-US" b="1" u="sng">
+              <a:sym typeface="+mn-ea"/>
+            </a:endParaRPr>
+          </a:p>
+          <a:p>
+            <a:pPr algn="l">
+              <a:lnSpc>
+                <a:spcPct val="130000"/>
+              </a:lnSpc>
+            </a:pPr>
+            <a:endParaRPr lang="en-US" altLang="en-US" b="1" u="sng"/>
+          </a:p>
+          <a:p>
+            <a:pPr algn="l">
+              <a:lnSpc>
+                <a:spcPct val="130000"/>
+              </a:lnSpc>
+            </a:pPr>
+            <a:r>
+              <a:rPr lang="en-US" altLang="en-US" b="1">
+                <a:sym typeface="+mn-ea"/>
+              </a:rPr>
+              <a:t>Both single file and multi file torrents are handled, file writing is also asynchronous.</a:t>
+            </a:r>
+            <a:endParaRPr lang="en-US" altLang="en-US" b="1">
+              <a:sym typeface="+mn-ea"/>
+            </a:endParaRPr>
+          </a:p>
+          <a:p>
+            <a:pPr algn="l">
+              <a:lnSpc>
+                <a:spcPct val="130000"/>
+              </a:lnSpc>
+            </a:pPr>
+            <a:endParaRPr lang="en-US" altLang="en-US" b="1">
+              <a:sym typeface="+mn-ea"/>
+            </a:endParaRPr>
+          </a:p>
+          <a:p>
+            <a:pPr algn="l">
+              <a:lnSpc>
+                <a:spcPct val="130000"/>
+              </a:lnSpc>
+            </a:pPr>
+            <a:endParaRPr lang="en-US" altLang="en-US" b="1"/>
+          </a:p>
+          <a:p>
+            <a:pPr algn="l">
+              <a:lnSpc>
+                <a:spcPct val="130000"/>
+              </a:lnSpc>
+            </a:pPr>
+            <a:r>
+              <a:rPr lang="en-US" altLang="en-US" b="1">
+                <a:sym typeface="+mn-ea"/>
+              </a:rPr>
+              <a:t>Both HTTP and UDP trackers are implemented. </a:t>
+            </a:r>
+            <a:endParaRPr lang="en-US" altLang="en-US" b="1"/>
+          </a:p>
+          <a:p>
+            <a:pPr algn="l">
+              <a:lnSpc>
+                <a:spcPct val="130000"/>
+              </a:lnSpc>
+            </a:pPr>
+            <a:endParaRPr lang="en-US" altLang="en-US" b="1"/>
           </a:p>
         </p:txBody>
       </p:sp>
@@ -6618,25 +7270,6 @@
               <a:latin typeface="Arial" panose="020B0604020202020204" pitchFamily="34" charset="0"/>
               <a:cs typeface="Arial" panose="020B0604020202020204" pitchFamily="34" charset="0"/>
             </a:endParaRPr>
-          </a:p>
-        </p:txBody>
-      </p:sp>
-      <p:sp>
-        <p:nvSpPr>
-          <p:cNvPr id="2" name="Content Placeholder 1"/>
-          <p:cNvSpPr/>
-          <p:nvPr>
-            <p:ph idx="1"/>
-          </p:nvPr>
-        </p:nvSpPr>
-        <p:spPr/>
-        <p:txBody>
-          <a:bodyPr/>
-          <a:p>
-            <a:endParaRPr lang="en-US" altLang="en-US"/>
-          </a:p>
-          <a:p>
-            <a:endParaRPr lang="en-US" altLang="en-US"/>
           </a:p>
         </p:txBody>
       </p:sp>
@@ -6824,6 +7457,1851 @@
 </p:sld>
 </file>
 
+<file path=ppt/slides/slide20.xml><?xml version="1.0" encoding="utf-8"?>
+<p:sld xmlns:a="http://schemas.openxmlformats.org/drawingml/2006/main" xmlns:r="http://schemas.openxmlformats.org/officeDocument/2006/relationships" xmlns:p="http://schemas.openxmlformats.org/presentationml/2006/main">
+  <p:cSld>
+    <p:spTree>
+      <p:nvGrpSpPr>
+        <p:cNvPr id="1" name=""/>
+        <p:cNvGrpSpPr/>
+        <p:nvPr/>
+      </p:nvGrpSpPr>
+      <p:grpSpPr/>
+      <p:sp>
+        <p:nvSpPr>
+          <p:cNvPr id="5" name="Title 4"/>
+          <p:cNvSpPr>
+            <a:spLocks noGrp="1"/>
+          </p:cNvSpPr>
+          <p:nvPr>
+            <p:ph type="title"/>
+          </p:nvPr>
+        </p:nvSpPr>
+        <p:spPr/>
+        <p:txBody>
+          <a:bodyPr>
+            <a:normAutofit fontScale="90000"/>
+          </a:bodyPr>
+          <a:p>
+            <a:pPr algn="ctr"/>
+            <a:r>
+              <a:rPr lang="en-US" altLang="en-US" sz="4000">
+                <a:latin typeface="Gubbi" panose="00000400000000000000" charset="0"/>
+                <a:cs typeface="Gubbi" panose="00000400000000000000" charset="0"/>
+              </a:rPr>
+              <a:t>WALK-THROUGH OF THE IMPLEMENTATION</a:t>
+            </a:r>
+            <a:endParaRPr lang="en-US" altLang="en-US" sz="4000">
+              <a:latin typeface="Gubbi" panose="00000400000000000000" charset="0"/>
+              <a:cs typeface="Gubbi" panose="00000400000000000000" charset="0"/>
+            </a:endParaRPr>
+          </a:p>
+        </p:txBody>
+      </p:sp>
+      <p:sp>
+        <p:nvSpPr>
+          <p:cNvPr id="8" name="Footer Placeholder 7"/>
+          <p:cNvSpPr>
+            <a:spLocks noGrp="1"/>
+          </p:cNvSpPr>
+          <p:nvPr>
+            <p:ph type="ftr" sz="quarter" idx="11"/>
+          </p:nvPr>
+        </p:nvSpPr>
+        <p:spPr>
+          <a:xfrm>
+            <a:off x="-5715" y="6094730"/>
+            <a:ext cx="12193270" cy="765175"/>
+          </a:xfrm>
+          <a:solidFill>
+            <a:srgbClr val="8F1218"/>
+          </a:solidFill>
+        </p:spPr>
+        <p:txBody>
+          <a:bodyPr>
+            <a:normAutofit lnSpcReduction="10000"/>
+          </a:bodyPr>
+          <a:p>
+            <a:pPr algn="l"/>
+            <a:r>
+              <a:rPr lang="en-US" altLang="zh-CN" sz="2000">
+                <a:solidFill>
+                  <a:schemeClr val="bg1"/>
+                </a:solidFill>
+                <a:latin typeface="Arial" panose="020B0604020202020204" pitchFamily="34" charset="0"/>
+                <a:cs typeface="Arial" panose="020B0604020202020204" pitchFamily="34" charset="0"/>
+              </a:rPr>
+              <a:t>   </a:t>
+            </a:r>
+            <a:r>
+              <a:rPr lang="zh-CN" altLang="en-US" sz="2000">
+                <a:solidFill>
+                  <a:schemeClr val="bg1"/>
+                </a:solidFill>
+                <a:latin typeface="Arial" panose="020B0604020202020204" pitchFamily="34" charset="0"/>
+                <a:cs typeface="Arial" panose="020B0604020202020204" pitchFamily="34" charset="0"/>
+              </a:rPr>
+              <a:t>Arjun Ashok</a:t>
+            </a:r>
+            <a:r>
+              <a:rPr lang="en-US" altLang="zh-CN" sz="2000">
+                <a:solidFill>
+                  <a:schemeClr val="bg1"/>
+                </a:solidFill>
+                <a:latin typeface="Arial" panose="020B0604020202020204" pitchFamily="34" charset="0"/>
+                <a:cs typeface="Arial" panose="020B0604020202020204" pitchFamily="34" charset="0"/>
+              </a:rPr>
+              <a:t>, 18PW03          TCP/IP Lab Package	   BitTorrent Client                         April 20, 2020</a:t>
+            </a:r>
+            <a:endParaRPr lang="en-US" altLang="zh-CN" sz="2000">
+              <a:solidFill>
+                <a:schemeClr val="bg1"/>
+              </a:solidFill>
+              <a:latin typeface="Arial" panose="020B0604020202020204" pitchFamily="34" charset="0"/>
+              <a:cs typeface="Arial" panose="020B0604020202020204" pitchFamily="34" charset="0"/>
+            </a:endParaRPr>
+          </a:p>
+        </p:txBody>
+      </p:sp>
+      <p:sp>
+        <p:nvSpPr>
+          <p:cNvPr id="2" name="Content Placeholder 1"/>
+          <p:cNvSpPr/>
+          <p:nvPr>
+            <p:ph idx="1"/>
+          </p:nvPr>
+        </p:nvSpPr>
+        <p:spPr>
+          <a:xfrm>
+            <a:off x="647700" y="1393825"/>
+            <a:ext cx="10515600" cy="5038725"/>
+          </a:xfrm>
+        </p:spPr>
+        <p:txBody>
+          <a:bodyPr>
+            <a:normAutofit lnSpcReduction="20000"/>
+          </a:bodyPr>
+          <a:p>
+            <a:r>
+              <a:rPr lang="" altLang="en-US" b="1"/>
+              <a:t>Total lines of code - 1350</a:t>
+            </a:r>
+            <a:endParaRPr lang="" altLang="en-US" b="1"/>
+          </a:p>
+          <a:p>
+            <a:r>
+              <a:rPr lang="" altLang="en-US" b="1"/>
+              <a:t>Split into 6 files(each file represents a concept in the form of many classes)</a:t>
+            </a:r>
+            <a:endParaRPr lang="" altLang="en-US" b="1"/>
+          </a:p>
+          <a:p>
+            <a:endParaRPr lang="" altLang="en-US" b="1"/>
+          </a:p>
+          <a:p>
+            <a:endParaRPr lang="" altLang="en-US" b="1"/>
+          </a:p>
+          <a:p>
+            <a:pPr marL="0" indent="0">
+              <a:lnSpc>
+                <a:spcPct val="120000"/>
+              </a:lnSpc>
+              <a:buNone/>
+            </a:pPr>
+            <a:r>
+              <a:rPr lang="" altLang="en-US" b="1"/>
+              <a:t>1. </a:t>
+            </a:r>
+            <a:r>
+              <a:rPr lang="" altLang="en-US" b="1" u="sng"/>
+              <a:t>own_bencoding.py</a:t>
+            </a:r>
+            <a:r>
+              <a:rPr lang="" altLang="en-US" b="1"/>
+              <a:t> - Contains classes Encoder and Decoder for bencoding and bdecoding respectively</a:t>
+            </a:r>
+            <a:endParaRPr lang="" altLang="en-US" b="1"/>
+          </a:p>
+          <a:p>
+            <a:pPr marL="0" indent="0">
+              <a:lnSpc>
+                <a:spcPct val="120000"/>
+              </a:lnSpc>
+              <a:buNone/>
+            </a:pPr>
+            <a:endParaRPr lang="" altLang="en-US" b="1"/>
+          </a:p>
+          <a:p>
+            <a:pPr marL="0" indent="0">
+              <a:lnSpc>
+                <a:spcPct val="120000"/>
+              </a:lnSpc>
+              <a:buNone/>
+            </a:pPr>
+            <a:endParaRPr lang="" altLang="en-US" b="1"/>
+          </a:p>
+          <a:p>
+            <a:pPr marL="0" indent="0">
+              <a:buNone/>
+            </a:pPr>
+            <a:r>
+              <a:rPr lang="" altLang="en-US" b="1"/>
+              <a:t>2. </a:t>
+            </a:r>
+            <a:r>
+              <a:rPr lang="" altLang="en-US" b="1" u="sng"/>
+              <a:t>tracker.py</a:t>
+            </a:r>
+            <a:r>
+              <a:rPr lang="" altLang="en-US" b="1"/>
+              <a:t> - Contains tracker class</a:t>
+            </a:r>
+            <a:endParaRPr lang="" altLang="en-US" b="1"/>
+          </a:p>
+          <a:p>
+            <a:pPr marL="0" indent="0">
+              <a:lnSpc>
+                <a:spcPct val="120000"/>
+              </a:lnSpc>
+              <a:buNone/>
+            </a:pPr>
+            <a:endParaRPr lang="" altLang="en-US" b="1"/>
+          </a:p>
+        </p:txBody>
+      </p:sp>
+    </p:spTree>
+  </p:cSld>
+  <p:clrMapOvr>
+    <a:masterClrMapping/>
+  </p:clrMapOvr>
+</p:sld>
+</file>
+
+<file path=ppt/slides/slide21.xml><?xml version="1.0" encoding="utf-8"?>
+<p:sld xmlns:a="http://schemas.openxmlformats.org/drawingml/2006/main" xmlns:r="http://schemas.openxmlformats.org/officeDocument/2006/relationships" xmlns:p="http://schemas.openxmlformats.org/presentationml/2006/main">
+  <p:cSld>
+    <p:spTree>
+      <p:nvGrpSpPr>
+        <p:cNvPr id="1" name=""/>
+        <p:cNvGrpSpPr/>
+        <p:nvPr/>
+      </p:nvGrpSpPr>
+      <p:grpSpPr/>
+      <p:sp>
+        <p:nvSpPr>
+          <p:cNvPr id="5" name="Title 4"/>
+          <p:cNvSpPr>
+            <a:spLocks noGrp="1"/>
+          </p:cNvSpPr>
+          <p:nvPr>
+            <p:ph type="title"/>
+          </p:nvPr>
+        </p:nvSpPr>
+        <p:spPr/>
+        <p:txBody>
+          <a:bodyPr>
+            <a:normAutofit fontScale="90000"/>
+          </a:bodyPr>
+          <a:p>
+            <a:pPr algn="ctr"/>
+            <a:r>
+              <a:rPr lang="en-US" altLang="en-US" sz="4000">
+                <a:latin typeface="Gubbi" panose="00000400000000000000" charset="0"/>
+                <a:cs typeface="Gubbi" panose="00000400000000000000" charset="0"/>
+              </a:rPr>
+              <a:t>WALK-THROUGH OF THE IMPLEMENTATION</a:t>
+            </a:r>
+            <a:endParaRPr lang="en-US" altLang="en-US" sz="4000">
+              <a:latin typeface="Gubbi" panose="00000400000000000000" charset="0"/>
+              <a:cs typeface="Gubbi" panose="00000400000000000000" charset="0"/>
+            </a:endParaRPr>
+          </a:p>
+        </p:txBody>
+      </p:sp>
+      <p:sp>
+        <p:nvSpPr>
+          <p:cNvPr id="8" name="Footer Placeholder 7"/>
+          <p:cNvSpPr>
+            <a:spLocks noGrp="1"/>
+          </p:cNvSpPr>
+          <p:nvPr>
+            <p:ph type="ftr" sz="quarter" idx="11"/>
+          </p:nvPr>
+        </p:nvSpPr>
+        <p:spPr>
+          <a:xfrm>
+            <a:off x="-5715" y="6094730"/>
+            <a:ext cx="12193270" cy="765175"/>
+          </a:xfrm>
+          <a:solidFill>
+            <a:srgbClr val="8F1218"/>
+          </a:solidFill>
+        </p:spPr>
+        <p:txBody>
+          <a:bodyPr>
+            <a:normAutofit lnSpcReduction="10000"/>
+          </a:bodyPr>
+          <a:p>
+            <a:pPr algn="l"/>
+            <a:r>
+              <a:rPr lang="en-US" altLang="zh-CN" sz="2000">
+                <a:solidFill>
+                  <a:schemeClr val="bg1"/>
+                </a:solidFill>
+                <a:latin typeface="Arial" panose="020B0604020202020204" pitchFamily="34" charset="0"/>
+                <a:cs typeface="Arial" panose="020B0604020202020204" pitchFamily="34" charset="0"/>
+              </a:rPr>
+              <a:t>   </a:t>
+            </a:r>
+            <a:r>
+              <a:rPr lang="zh-CN" altLang="en-US" sz="2000">
+                <a:solidFill>
+                  <a:schemeClr val="bg1"/>
+                </a:solidFill>
+                <a:latin typeface="Arial" panose="020B0604020202020204" pitchFamily="34" charset="0"/>
+                <a:cs typeface="Arial" panose="020B0604020202020204" pitchFamily="34" charset="0"/>
+              </a:rPr>
+              <a:t>Arjun Ashok</a:t>
+            </a:r>
+            <a:r>
+              <a:rPr lang="en-US" altLang="zh-CN" sz="2000">
+                <a:solidFill>
+                  <a:schemeClr val="bg1"/>
+                </a:solidFill>
+                <a:latin typeface="Arial" panose="020B0604020202020204" pitchFamily="34" charset="0"/>
+                <a:cs typeface="Arial" panose="020B0604020202020204" pitchFamily="34" charset="0"/>
+              </a:rPr>
+              <a:t>, 18PW03          TCP/IP Lab Package	   BitTorrent Client                         April 20, 2020</a:t>
+            </a:r>
+            <a:endParaRPr lang="en-US" altLang="zh-CN" sz="2000">
+              <a:solidFill>
+                <a:schemeClr val="bg1"/>
+              </a:solidFill>
+              <a:latin typeface="Arial" panose="020B0604020202020204" pitchFamily="34" charset="0"/>
+              <a:cs typeface="Arial" panose="020B0604020202020204" pitchFamily="34" charset="0"/>
+            </a:endParaRPr>
+          </a:p>
+        </p:txBody>
+      </p:sp>
+      <p:sp>
+        <p:nvSpPr>
+          <p:cNvPr id="2" name="Content Placeholder 1"/>
+          <p:cNvSpPr/>
+          <p:nvPr>
+            <p:ph idx="1"/>
+          </p:nvPr>
+        </p:nvSpPr>
+        <p:spPr>
+          <a:xfrm>
+            <a:off x="647700" y="1393825"/>
+            <a:ext cx="10515600" cy="5038725"/>
+          </a:xfrm>
+        </p:spPr>
+        <p:txBody>
+          <a:bodyPr>
+            <a:normAutofit lnSpcReduction="20000"/>
+          </a:bodyPr>
+          <a:p>
+            <a:pPr marL="0" indent="0">
+              <a:lnSpc>
+                <a:spcPct val="120000"/>
+              </a:lnSpc>
+              <a:buNone/>
+            </a:pPr>
+            <a:endParaRPr lang="en-US" altLang="en-US" b="1">
+              <a:sym typeface="+mn-ea"/>
+            </a:endParaRPr>
+          </a:p>
+          <a:p>
+            <a:pPr marL="0" indent="0">
+              <a:lnSpc>
+                <a:spcPct val="120000"/>
+              </a:lnSpc>
+              <a:buNone/>
+            </a:pPr>
+            <a:endParaRPr lang="en-US" altLang="en-US" b="1">
+              <a:sym typeface="+mn-ea"/>
+            </a:endParaRPr>
+          </a:p>
+          <a:p>
+            <a:pPr marL="0" indent="0">
+              <a:lnSpc>
+                <a:spcPct val="120000"/>
+              </a:lnSpc>
+              <a:buNone/>
+            </a:pPr>
+            <a:r>
+              <a:rPr lang="en-US" altLang="en-US" b="1">
+                <a:sym typeface="+mn-ea"/>
+              </a:rPr>
+              <a:t>3. </a:t>
+            </a:r>
+            <a:r>
+              <a:rPr lang="en-US" altLang="en-US" b="1" u="sng">
+                <a:sym typeface="+mn-ea"/>
+              </a:rPr>
+              <a:t>peer.py</a:t>
+            </a:r>
+            <a:r>
+              <a:rPr lang="en-US" altLang="en-US" b="1">
+                <a:sym typeface="+mn-ea"/>
+              </a:rPr>
+              <a:t> - Contains PeerConnection classes and a global PeerStreamIterator class for iterating through the stream(socket stream) of a single peer</a:t>
+            </a:r>
+            <a:endParaRPr lang="en-US" altLang="en-US" b="1">
+              <a:sym typeface="+mn-ea"/>
+            </a:endParaRPr>
+          </a:p>
+          <a:p>
+            <a:pPr marL="0" indent="0">
+              <a:lnSpc>
+                <a:spcPct val="120000"/>
+              </a:lnSpc>
+              <a:buNone/>
+            </a:pPr>
+            <a:endParaRPr lang="en-US" altLang="en-US" b="1">
+              <a:sym typeface="+mn-ea"/>
+            </a:endParaRPr>
+          </a:p>
+          <a:p>
+            <a:pPr marL="0" indent="0">
+              <a:lnSpc>
+                <a:spcPct val="120000"/>
+              </a:lnSpc>
+              <a:buNone/>
+            </a:pPr>
+            <a:endParaRPr lang="en-US" altLang="en-US" b="1">
+              <a:sym typeface="+mn-ea"/>
+            </a:endParaRPr>
+          </a:p>
+          <a:p>
+            <a:pPr marL="0" indent="0">
+              <a:lnSpc>
+                <a:spcPct val="120000"/>
+              </a:lnSpc>
+              <a:buNone/>
+            </a:pPr>
+            <a:endParaRPr lang="en-US" altLang="en-US" b="1">
+              <a:sym typeface="+mn-ea"/>
+            </a:endParaRPr>
+          </a:p>
+          <a:p>
+            <a:pPr marL="0" indent="0">
+              <a:lnSpc>
+                <a:spcPct val="120000"/>
+              </a:lnSpc>
+              <a:buNone/>
+            </a:pPr>
+            <a:endParaRPr lang="en-US" altLang="en-US" b="1">
+              <a:sym typeface="+mn-ea"/>
+            </a:endParaRPr>
+          </a:p>
+          <a:p>
+            <a:pPr marL="0" indent="0">
+              <a:lnSpc>
+                <a:spcPct val="120000"/>
+              </a:lnSpc>
+              <a:buNone/>
+            </a:pPr>
+            <a:endParaRPr lang="en-US" altLang="en-US" b="1"/>
+          </a:p>
+          <a:p>
+            <a:pPr marL="0" indent="0">
+              <a:buNone/>
+            </a:pPr>
+            <a:r>
+              <a:rPr lang="en-US" altLang="en-US" b="1">
+                <a:sym typeface="+mn-ea"/>
+              </a:rPr>
+              <a:t>4. </a:t>
+            </a:r>
+            <a:r>
+              <a:rPr lang="en-US" altLang="en-US" b="1" u="sng">
+                <a:sym typeface="+mn-ea"/>
+              </a:rPr>
+              <a:t>piece_manager.py</a:t>
+            </a:r>
+            <a:r>
+              <a:rPr lang="en-US" altLang="en-US" b="1">
+                <a:sym typeface="+mn-ea"/>
+              </a:rPr>
+              <a:t> - Contains the classes PieceManager, Piece and Block.</a:t>
+            </a:r>
+            <a:endParaRPr lang="en-US" altLang="en-US" b="1">
+              <a:sym typeface="+mn-ea"/>
+            </a:endParaRPr>
+          </a:p>
+          <a:p>
+            <a:pPr marL="0" indent="0">
+              <a:buNone/>
+            </a:pPr>
+            <a:endParaRPr lang="en-US" altLang="en-US" b="1">
+              <a:sym typeface="+mn-ea"/>
+            </a:endParaRPr>
+          </a:p>
+          <a:p>
+            <a:pPr marL="0" indent="0">
+              <a:buNone/>
+            </a:pPr>
+            <a:endParaRPr lang="en-US" altLang="en-US" b="1"/>
+          </a:p>
+          <a:p>
+            <a:pPr marL="0" indent="0">
+              <a:lnSpc>
+                <a:spcPct val="110000"/>
+              </a:lnSpc>
+              <a:buNone/>
+            </a:pPr>
+            <a:endParaRPr lang="en-US" altLang="en-US" b="1"/>
+          </a:p>
+        </p:txBody>
+      </p:sp>
+    </p:spTree>
+  </p:cSld>
+  <p:clrMapOvr>
+    <a:masterClrMapping/>
+  </p:clrMapOvr>
+</p:sld>
+</file>
+
+<file path=ppt/slides/slide22.xml><?xml version="1.0" encoding="utf-8"?>
+<p:sld xmlns:a="http://schemas.openxmlformats.org/drawingml/2006/main" xmlns:r="http://schemas.openxmlformats.org/officeDocument/2006/relationships" xmlns:p="http://schemas.openxmlformats.org/presentationml/2006/main">
+  <p:cSld>
+    <p:spTree>
+      <p:nvGrpSpPr>
+        <p:cNvPr id="1" name=""/>
+        <p:cNvGrpSpPr/>
+        <p:nvPr/>
+      </p:nvGrpSpPr>
+      <p:grpSpPr/>
+      <p:sp>
+        <p:nvSpPr>
+          <p:cNvPr id="5" name="Title 4"/>
+          <p:cNvSpPr>
+            <a:spLocks noGrp="1"/>
+          </p:cNvSpPr>
+          <p:nvPr>
+            <p:ph type="title"/>
+          </p:nvPr>
+        </p:nvSpPr>
+        <p:spPr/>
+        <p:txBody>
+          <a:bodyPr>
+            <a:normAutofit fontScale="90000"/>
+          </a:bodyPr>
+          <a:p>
+            <a:pPr algn="ctr"/>
+            <a:r>
+              <a:rPr lang="en-US" altLang="en-US" sz="4000">
+                <a:latin typeface="Gubbi" panose="00000400000000000000" charset="0"/>
+                <a:cs typeface="Gubbi" panose="00000400000000000000" charset="0"/>
+              </a:rPr>
+              <a:t>WALK-THROUGH OF THE IMPLEMENTATION</a:t>
+            </a:r>
+            <a:endParaRPr lang="en-US" altLang="en-US" sz="4000">
+              <a:latin typeface="Gubbi" panose="00000400000000000000" charset="0"/>
+              <a:cs typeface="Gubbi" panose="00000400000000000000" charset="0"/>
+            </a:endParaRPr>
+          </a:p>
+        </p:txBody>
+      </p:sp>
+      <p:sp>
+        <p:nvSpPr>
+          <p:cNvPr id="8" name="Footer Placeholder 7"/>
+          <p:cNvSpPr>
+            <a:spLocks noGrp="1"/>
+          </p:cNvSpPr>
+          <p:nvPr>
+            <p:ph type="ftr" sz="quarter" idx="11"/>
+          </p:nvPr>
+        </p:nvSpPr>
+        <p:spPr>
+          <a:xfrm>
+            <a:off x="-5715" y="6094730"/>
+            <a:ext cx="12193270" cy="765175"/>
+          </a:xfrm>
+          <a:solidFill>
+            <a:srgbClr val="8F1218"/>
+          </a:solidFill>
+        </p:spPr>
+        <p:txBody>
+          <a:bodyPr>
+            <a:normAutofit lnSpcReduction="10000"/>
+          </a:bodyPr>
+          <a:p>
+            <a:pPr algn="l"/>
+            <a:r>
+              <a:rPr lang="en-US" altLang="zh-CN" sz="2000">
+                <a:solidFill>
+                  <a:schemeClr val="bg1"/>
+                </a:solidFill>
+                <a:latin typeface="Arial" panose="020B0604020202020204" pitchFamily="34" charset="0"/>
+                <a:cs typeface="Arial" panose="020B0604020202020204" pitchFamily="34" charset="0"/>
+              </a:rPr>
+              <a:t>   </a:t>
+            </a:r>
+            <a:r>
+              <a:rPr lang="zh-CN" altLang="en-US" sz="2000">
+                <a:solidFill>
+                  <a:schemeClr val="bg1"/>
+                </a:solidFill>
+                <a:latin typeface="Arial" panose="020B0604020202020204" pitchFamily="34" charset="0"/>
+                <a:cs typeface="Arial" panose="020B0604020202020204" pitchFamily="34" charset="0"/>
+              </a:rPr>
+              <a:t>Arjun Ashok</a:t>
+            </a:r>
+            <a:r>
+              <a:rPr lang="en-US" altLang="zh-CN" sz="2000">
+                <a:solidFill>
+                  <a:schemeClr val="bg1"/>
+                </a:solidFill>
+                <a:latin typeface="Arial" panose="020B0604020202020204" pitchFamily="34" charset="0"/>
+                <a:cs typeface="Arial" panose="020B0604020202020204" pitchFamily="34" charset="0"/>
+              </a:rPr>
+              <a:t>, 18PW03          TCP/IP Lab Package	   BitTorrent Client                         April 20, 2020</a:t>
+            </a:r>
+            <a:endParaRPr lang="en-US" altLang="zh-CN" sz="2000">
+              <a:solidFill>
+                <a:schemeClr val="bg1"/>
+              </a:solidFill>
+              <a:latin typeface="Arial" panose="020B0604020202020204" pitchFamily="34" charset="0"/>
+              <a:cs typeface="Arial" panose="020B0604020202020204" pitchFamily="34" charset="0"/>
+            </a:endParaRPr>
+          </a:p>
+        </p:txBody>
+      </p:sp>
+      <p:sp>
+        <p:nvSpPr>
+          <p:cNvPr id="2" name="Content Placeholder 1"/>
+          <p:cNvSpPr/>
+          <p:nvPr>
+            <p:ph idx="1"/>
+          </p:nvPr>
+        </p:nvSpPr>
+        <p:spPr>
+          <a:xfrm>
+            <a:off x="647700" y="1393825"/>
+            <a:ext cx="10515600" cy="5038725"/>
+          </a:xfrm>
+        </p:spPr>
+        <p:txBody>
+          <a:bodyPr>
+            <a:normAutofit lnSpcReduction="20000"/>
+          </a:bodyPr>
+          <a:p>
+            <a:pPr marL="0" indent="0">
+              <a:lnSpc>
+                <a:spcPct val="120000"/>
+              </a:lnSpc>
+              <a:buNone/>
+            </a:pPr>
+            <a:endParaRPr lang="en-US" altLang="en-US" b="1">
+              <a:sym typeface="+mn-ea"/>
+            </a:endParaRPr>
+          </a:p>
+          <a:p>
+            <a:pPr marL="0" indent="0">
+              <a:lnSpc>
+                <a:spcPct val="120000"/>
+              </a:lnSpc>
+              <a:buNone/>
+            </a:pPr>
+            <a:endParaRPr lang="en-US" altLang="en-US" b="1">
+              <a:sym typeface="+mn-ea"/>
+            </a:endParaRPr>
+          </a:p>
+          <a:p>
+            <a:pPr marL="0" indent="0">
+              <a:lnSpc>
+                <a:spcPct val="110000"/>
+              </a:lnSpc>
+              <a:buNone/>
+            </a:pPr>
+            <a:r>
+              <a:rPr lang="en-US" altLang="en-US" b="1">
+                <a:sym typeface="+mn-ea"/>
+              </a:rPr>
+              <a:t>5. </a:t>
+            </a:r>
+            <a:r>
+              <a:rPr lang="en-US" altLang="en-US" b="1" u="sng">
+                <a:sym typeface="+mn-ea"/>
+              </a:rPr>
+              <a:t>protocol.py</a:t>
+            </a:r>
+            <a:r>
+              <a:rPr lang="en-US" altLang="en-US" b="1">
+                <a:sym typeface="+mn-ea"/>
+              </a:rPr>
+              <a:t> - contains a class with the encoding and decoding algorithm for every type of message which can be sent/received.</a:t>
+            </a:r>
+            <a:endParaRPr lang="en-US" altLang="en-US" b="1">
+              <a:sym typeface="+mn-ea"/>
+            </a:endParaRPr>
+          </a:p>
+          <a:p>
+            <a:pPr marL="0" indent="0">
+              <a:lnSpc>
+                <a:spcPct val="110000"/>
+              </a:lnSpc>
+              <a:buNone/>
+            </a:pPr>
+            <a:endParaRPr lang="en-US" altLang="en-US" b="1">
+              <a:sym typeface="+mn-ea"/>
+            </a:endParaRPr>
+          </a:p>
+          <a:p>
+            <a:pPr marL="0" indent="0">
+              <a:lnSpc>
+                <a:spcPct val="110000"/>
+              </a:lnSpc>
+              <a:buNone/>
+            </a:pPr>
+            <a:endParaRPr lang="en-US" altLang="en-US" b="1">
+              <a:sym typeface="+mn-ea"/>
+            </a:endParaRPr>
+          </a:p>
+          <a:p>
+            <a:pPr marL="0" indent="0">
+              <a:lnSpc>
+                <a:spcPct val="110000"/>
+              </a:lnSpc>
+              <a:buNone/>
+            </a:pPr>
+            <a:endParaRPr lang="en-US" altLang="en-US" b="1">
+              <a:sym typeface="+mn-ea"/>
+            </a:endParaRPr>
+          </a:p>
+          <a:p>
+            <a:pPr marL="0" indent="0">
+              <a:lnSpc>
+                <a:spcPct val="110000"/>
+              </a:lnSpc>
+              <a:buNone/>
+            </a:pPr>
+            <a:endParaRPr lang="en-US" altLang="en-US" b="1"/>
+          </a:p>
+          <a:p>
+            <a:pPr marL="0" indent="0">
+              <a:lnSpc>
+                <a:spcPct val="120000"/>
+              </a:lnSpc>
+              <a:buNone/>
+            </a:pPr>
+            <a:r>
+              <a:rPr lang="en-US" altLang="en-US" b="1">
+                <a:sym typeface="+mn-ea"/>
+              </a:rPr>
+              <a:t>6. async_client.py - the torrent client which runs the torrent, by directly/indirectly incorporating the above classes.</a:t>
+            </a:r>
+            <a:endParaRPr lang="en-US" altLang="en-US" b="1"/>
+          </a:p>
+          <a:p>
+            <a:pPr marL="0" indent="0">
+              <a:lnSpc>
+                <a:spcPct val="120000"/>
+              </a:lnSpc>
+              <a:buNone/>
+            </a:pPr>
+            <a:endParaRPr lang="en-US" altLang="en-US" b="1">
+              <a:sym typeface="+mn-ea"/>
+            </a:endParaRPr>
+          </a:p>
+          <a:p>
+            <a:pPr marL="0" indent="0">
+              <a:buNone/>
+            </a:pPr>
+            <a:endParaRPr lang="en-US" altLang="en-US" b="1">
+              <a:sym typeface="+mn-ea"/>
+            </a:endParaRPr>
+          </a:p>
+          <a:p>
+            <a:pPr marL="0" indent="0">
+              <a:buNone/>
+            </a:pPr>
+            <a:endParaRPr lang="en-US" altLang="en-US" b="1"/>
+          </a:p>
+          <a:p>
+            <a:pPr marL="0" indent="0">
+              <a:lnSpc>
+                <a:spcPct val="110000"/>
+              </a:lnSpc>
+              <a:buNone/>
+            </a:pPr>
+            <a:endParaRPr lang="en-US" altLang="en-US" b="1"/>
+          </a:p>
+        </p:txBody>
+      </p:sp>
+    </p:spTree>
+  </p:cSld>
+  <p:clrMapOvr>
+    <a:masterClrMapping/>
+  </p:clrMapOvr>
+</p:sld>
+</file>
+
+<file path=ppt/slides/slide23.xml><?xml version="1.0" encoding="utf-8"?>
+<p:sld xmlns:a="http://schemas.openxmlformats.org/drawingml/2006/main" xmlns:r="http://schemas.openxmlformats.org/officeDocument/2006/relationships" xmlns:p="http://schemas.openxmlformats.org/presentationml/2006/main">
+  <p:cSld>
+    <p:spTree>
+      <p:nvGrpSpPr>
+        <p:cNvPr id="1" name=""/>
+        <p:cNvGrpSpPr/>
+        <p:nvPr/>
+      </p:nvGrpSpPr>
+      <p:grpSpPr/>
+      <p:sp>
+        <p:nvSpPr>
+          <p:cNvPr id="5" name="Title 4"/>
+          <p:cNvSpPr>
+            <a:spLocks noGrp="1"/>
+          </p:cNvSpPr>
+          <p:nvPr>
+            <p:ph type="title"/>
+          </p:nvPr>
+        </p:nvSpPr>
+        <p:spPr/>
+        <p:txBody>
+          <a:bodyPr>
+            <a:normAutofit fontScale="90000"/>
+          </a:bodyPr>
+          <a:p>
+            <a:pPr algn="ctr"/>
+            <a:r>
+              <a:rPr lang="en-US" altLang="en-US" sz="4000">
+                <a:latin typeface="Gubbi" panose="00000400000000000000" charset="0"/>
+                <a:cs typeface="Gubbi" panose="00000400000000000000" charset="0"/>
+              </a:rPr>
+              <a:t>WALK-THROUGH OF THE IMPLEMENTATION</a:t>
+            </a:r>
+            <a:endParaRPr lang="en-US" altLang="en-US" sz="4000">
+              <a:latin typeface="Gubbi" panose="00000400000000000000" charset="0"/>
+              <a:cs typeface="Gubbi" panose="00000400000000000000" charset="0"/>
+            </a:endParaRPr>
+          </a:p>
+        </p:txBody>
+      </p:sp>
+      <p:sp>
+        <p:nvSpPr>
+          <p:cNvPr id="8" name="Footer Placeholder 7"/>
+          <p:cNvSpPr>
+            <a:spLocks noGrp="1"/>
+          </p:cNvSpPr>
+          <p:nvPr>
+            <p:ph type="ftr" sz="quarter" idx="11"/>
+          </p:nvPr>
+        </p:nvSpPr>
+        <p:spPr>
+          <a:xfrm>
+            <a:off x="-5715" y="6094730"/>
+            <a:ext cx="12193270" cy="765175"/>
+          </a:xfrm>
+          <a:solidFill>
+            <a:srgbClr val="8F1218"/>
+          </a:solidFill>
+        </p:spPr>
+        <p:txBody>
+          <a:bodyPr>
+            <a:normAutofit lnSpcReduction="10000"/>
+          </a:bodyPr>
+          <a:p>
+            <a:pPr algn="l"/>
+            <a:r>
+              <a:rPr lang="en-US" altLang="zh-CN" sz="2000">
+                <a:solidFill>
+                  <a:schemeClr val="bg1"/>
+                </a:solidFill>
+                <a:latin typeface="Arial" panose="020B0604020202020204" pitchFamily="34" charset="0"/>
+                <a:cs typeface="Arial" panose="020B0604020202020204" pitchFamily="34" charset="0"/>
+              </a:rPr>
+              <a:t>   </a:t>
+            </a:r>
+            <a:r>
+              <a:rPr lang="zh-CN" altLang="en-US" sz="2000">
+                <a:solidFill>
+                  <a:schemeClr val="bg1"/>
+                </a:solidFill>
+                <a:latin typeface="Arial" panose="020B0604020202020204" pitchFamily="34" charset="0"/>
+                <a:cs typeface="Arial" panose="020B0604020202020204" pitchFamily="34" charset="0"/>
+              </a:rPr>
+              <a:t>Arjun Ashok</a:t>
+            </a:r>
+            <a:r>
+              <a:rPr lang="en-US" altLang="zh-CN" sz="2000">
+                <a:solidFill>
+                  <a:schemeClr val="bg1"/>
+                </a:solidFill>
+                <a:latin typeface="Arial" panose="020B0604020202020204" pitchFamily="34" charset="0"/>
+                <a:cs typeface="Arial" panose="020B0604020202020204" pitchFamily="34" charset="0"/>
+              </a:rPr>
+              <a:t>, 18PW03          TCP/IP Lab Package	   BitTorrent Client                         April 20, 2020</a:t>
+            </a:r>
+            <a:endParaRPr lang="en-US" altLang="zh-CN" sz="2000">
+              <a:solidFill>
+                <a:schemeClr val="bg1"/>
+              </a:solidFill>
+              <a:latin typeface="Arial" panose="020B0604020202020204" pitchFamily="34" charset="0"/>
+              <a:cs typeface="Arial" panose="020B0604020202020204" pitchFamily="34" charset="0"/>
+            </a:endParaRPr>
+          </a:p>
+        </p:txBody>
+      </p:sp>
+      <p:sp>
+        <p:nvSpPr>
+          <p:cNvPr id="2" name="Content Placeholder 1"/>
+          <p:cNvSpPr/>
+          <p:nvPr>
+            <p:ph idx="1"/>
+          </p:nvPr>
+        </p:nvSpPr>
+        <p:spPr>
+          <a:xfrm>
+            <a:off x="647700" y="1393825"/>
+            <a:ext cx="10515600" cy="5038725"/>
+          </a:xfrm>
+        </p:spPr>
+        <p:txBody>
+          <a:bodyPr>
+            <a:normAutofit lnSpcReduction="10000"/>
+          </a:bodyPr>
+          <a:p>
+            <a:endParaRPr lang="en-US" altLang="en-US" b="1"/>
+          </a:p>
+          <a:p>
+            <a:r>
+              <a:rPr lang="" altLang="en-US" b="1"/>
+              <a:t>Walk-through the code.</a:t>
+            </a:r>
+            <a:endParaRPr lang="" altLang="en-US" b="1"/>
+          </a:p>
+        </p:txBody>
+      </p:sp>
+    </p:spTree>
+  </p:cSld>
+  <p:clrMapOvr>
+    <a:masterClrMapping/>
+  </p:clrMapOvr>
+</p:sld>
+</file>
+
+<file path=ppt/slides/slide24.xml><?xml version="1.0" encoding="utf-8"?>
+<p:sld xmlns:a="http://schemas.openxmlformats.org/drawingml/2006/main" xmlns:r="http://schemas.openxmlformats.org/officeDocument/2006/relationships" xmlns:p="http://schemas.openxmlformats.org/presentationml/2006/main">
+  <p:cSld>
+    <p:spTree>
+      <p:nvGrpSpPr>
+        <p:cNvPr id="1" name=""/>
+        <p:cNvGrpSpPr/>
+        <p:nvPr/>
+      </p:nvGrpSpPr>
+      <p:grpSpPr/>
+      <p:sp>
+        <p:nvSpPr>
+          <p:cNvPr id="5" name="Title 4"/>
+          <p:cNvSpPr>
+            <a:spLocks noGrp="1"/>
+          </p:cNvSpPr>
+          <p:nvPr>
+            <p:ph type="title"/>
+          </p:nvPr>
+        </p:nvSpPr>
+        <p:spPr/>
+        <p:txBody>
+          <a:bodyPr>
+            <a:normAutofit/>
+          </a:bodyPr>
+          <a:p>
+            <a:pPr algn="ctr"/>
+            <a:r>
+              <a:rPr lang="en-US" altLang="en-US" sz="4000">
+                <a:latin typeface="Gubbi" panose="00000400000000000000" charset="0"/>
+                <a:cs typeface="Gubbi" panose="00000400000000000000" charset="0"/>
+              </a:rPr>
+              <a:t>DEMO</a:t>
+            </a:r>
+            <a:endParaRPr lang="en-US" altLang="en-US" sz="4000">
+              <a:latin typeface="Gubbi" panose="00000400000000000000" charset="0"/>
+              <a:cs typeface="Gubbi" panose="00000400000000000000" charset="0"/>
+            </a:endParaRPr>
+          </a:p>
+        </p:txBody>
+      </p:sp>
+      <p:sp>
+        <p:nvSpPr>
+          <p:cNvPr id="8" name="Footer Placeholder 7"/>
+          <p:cNvSpPr>
+            <a:spLocks noGrp="1"/>
+          </p:cNvSpPr>
+          <p:nvPr>
+            <p:ph type="ftr" sz="quarter" idx="11"/>
+          </p:nvPr>
+        </p:nvSpPr>
+        <p:spPr>
+          <a:xfrm>
+            <a:off x="-5715" y="6094730"/>
+            <a:ext cx="12193270" cy="765175"/>
+          </a:xfrm>
+          <a:solidFill>
+            <a:srgbClr val="8F1218"/>
+          </a:solidFill>
+        </p:spPr>
+        <p:txBody>
+          <a:bodyPr>
+            <a:normAutofit lnSpcReduction="10000"/>
+          </a:bodyPr>
+          <a:p>
+            <a:pPr algn="l"/>
+            <a:r>
+              <a:rPr lang="en-US" altLang="zh-CN" sz="2000">
+                <a:solidFill>
+                  <a:schemeClr val="bg1"/>
+                </a:solidFill>
+                <a:latin typeface="Arial" panose="020B0604020202020204" pitchFamily="34" charset="0"/>
+                <a:cs typeface="Arial" panose="020B0604020202020204" pitchFamily="34" charset="0"/>
+              </a:rPr>
+              <a:t>   </a:t>
+            </a:r>
+            <a:r>
+              <a:rPr lang="zh-CN" altLang="en-US" sz="2000">
+                <a:solidFill>
+                  <a:schemeClr val="bg1"/>
+                </a:solidFill>
+                <a:latin typeface="Arial" panose="020B0604020202020204" pitchFamily="34" charset="0"/>
+                <a:cs typeface="Arial" panose="020B0604020202020204" pitchFamily="34" charset="0"/>
+              </a:rPr>
+              <a:t>Arjun Ashok</a:t>
+            </a:r>
+            <a:r>
+              <a:rPr lang="en-US" altLang="zh-CN" sz="2000">
+                <a:solidFill>
+                  <a:schemeClr val="bg1"/>
+                </a:solidFill>
+                <a:latin typeface="Arial" panose="020B0604020202020204" pitchFamily="34" charset="0"/>
+                <a:cs typeface="Arial" panose="020B0604020202020204" pitchFamily="34" charset="0"/>
+              </a:rPr>
+              <a:t>, 18PW03          TCP/IP Lab Package	   BitTorrent Client                         April 20, 2020</a:t>
+            </a:r>
+            <a:endParaRPr lang="en-US" altLang="zh-CN" sz="2000">
+              <a:solidFill>
+                <a:schemeClr val="bg1"/>
+              </a:solidFill>
+              <a:latin typeface="Arial" panose="020B0604020202020204" pitchFamily="34" charset="0"/>
+              <a:cs typeface="Arial" panose="020B0604020202020204" pitchFamily="34" charset="0"/>
+            </a:endParaRPr>
+          </a:p>
+        </p:txBody>
+      </p:sp>
+      <p:sp>
+        <p:nvSpPr>
+          <p:cNvPr id="2" name="Content Placeholder 1"/>
+          <p:cNvSpPr/>
+          <p:nvPr>
+            <p:ph idx="1"/>
+          </p:nvPr>
+        </p:nvSpPr>
+        <p:spPr/>
+        <p:txBody>
+          <a:bodyPr/>
+          <a:p>
+            <a:endParaRPr lang="en-US" altLang="en-US" b="1"/>
+          </a:p>
+          <a:p>
+            <a:r>
+              <a:rPr lang="en-US" altLang="en-US" b="1"/>
+              <a:t>Run the program</a:t>
+            </a:r>
+            <a:endParaRPr lang="en-US" altLang="en-US" b="1"/>
+          </a:p>
+          <a:p>
+            <a:endParaRPr lang="en-US" altLang="en-US" b="1"/>
+          </a:p>
+          <a:p>
+            <a:r>
+              <a:rPr lang="en-US" altLang="en-US" b="1"/>
+              <a:t>Wireshark - capture BitTorrent packets and explain.</a:t>
+            </a:r>
+            <a:endParaRPr lang="en-US" altLang="en-US" b="1"/>
+          </a:p>
+        </p:txBody>
+      </p:sp>
+    </p:spTree>
+  </p:cSld>
+  <p:clrMapOvr>
+    <a:masterClrMapping/>
+  </p:clrMapOvr>
+</p:sld>
+</file>
+
+<file path=ppt/slides/slide25.xml><?xml version="1.0" encoding="utf-8"?>
+<p:sld xmlns:a="http://schemas.openxmlformats.org/drawingml/2006/main" xmlns:r="http://schemas.openxmlformats.org/officeDocument/2006/relationships" xmlns:p="http://schemas.openxmlformats.org/presentationml/2006/main">
+  <p:cSld>
+    <p:spTree>
+      <p:nvGrpSpPr>
+        <p:cNvPr id="1" name=""/>
+        <p:cNvGrpSpPr/>
+        <p:nvPr/>
+      </p:nvGrpSpPr>
+      <p:grpSpPr/>
+      <p:sp>
+        <p:nvSpPr>
+          <p:cNvPr id="5" name="Title 4"/>
+          <p:cNvSpPr>
+            <a:spLocks noGrp="1"/>
+          </p:cNvSpPr>
+          <p:nvPr>
+            <p:ph type="title"/>
+          </p:nvPr>
+        </p:nvSpPr>
+        <p:spPr/>
+        <p:txBody>
+          <a:bodyPr>
+            <a:normAutofit/>
+          </a:bodyPr>
+          <a:p>
+            <a:pPr algn="ctr"/>
+            <a:r>
+              <a:rPr lang="en-US" altLang="en-US" sz="4000">
+                <a:latin typeface="Gubbi" panose="00000400000000000000" charset="0"/>
+                <a:cs typeface="Gubbi" panose="00000400000000000000" charset="0"/>
+              </a:rPr>
+              <a:t>LEARNING CURVE</a:t>
+            </a:r>
+            <a:endParaRPr lang="en-US" altLang="en-US" sz="4000">
+              <a:latin typeface="Gubbi" panose="00000400000000000000" charset="0"/>
+              <a:cs typeface="Gubbi" panose="00000400000000000000" charset="0"/>
+            </a:endParaRPr>
+          </a:p>
+        </p:txBody>
+      </p:sp>
+      <p:sp>
+        <p:nvSpPr>
+          <p:cNvPr id="8" name="Footer Placeholder 7"/>
+          <p:cNvSpPr>
+            <a:spLocks noGrp="1"/>
+          </p:cNvSpPr>
+          <p:nvPr>
+            <p:ph type="ftr" sz="quarter" idx="11"/>
+          </p:nvPr>
+        </p:nvSpPr>
+        <p:spPr>
+          <a:xfrm>
+            <a:off x="-5715" y="6094730"/>
+            <a:ext cx="12193270" cy="765175"/>
+          </a:xfrm>
+          <a:solidFill>
+            <a:srgbClr val="8F1218"/>
+          </a:solidFill>
+        </p:spPr>
+        <p:txBody>
+          <a:bodyPr>
+            <a:normAutofit lnSpcReduction="10000"/>
+          </a:bodyPr>
+          <a:p>
+            <a:pPr algn="l"/>
+            <a:r>
+              <a:rPr lang="en-US" altLang="zh-CN" sz="2000">
+                <a:solidFill>
+                  <a:schemeClr val="bg1"/>
+                </a:solidFill>
+                <a:latin typeface="Arial" panose="020B0604020202020204" pitchFamily="34" charset="0"/>
+                <a:cs typeface="Arial" panose="020B0604020202020204" pitchFamily="34" charset="0"/>
+              </a:rPr>
+              <a:t>   </a:t>
+            </a:r>
+            <a:r>
+              <a:rPr lang="zh-CN" altLang="en-US" sz="2000">
+                <a:solidFill>
+                  <a:schemeClr val="bg1"/>
+                </a:solidFill>
+                <a:latin typeface="Arial" panose="020B0604020202020204" pitchFamily="34" charset="0"/>
+                <a:cs typeface="Arial" panose="020B0604020202020204" pitchFamily="34" charset="0"/>
+              </a:rPr>
+              <a:t>Arjun Ashok</a:t>
+            </a:r>
+            <a:r>
+              <a:rPr lang="en-US" altLang="zh-CN" sz="2000">
+                <a:solidFill>
+                  <a:schemeClr val="bg1"/>
+                </a:solidFill>
+                <a:latin typeface="Arial" panose="020B0604020202020204" pitchFamily="34" charset="0"/>
+                <a:cs typeface="Arial" panose="020B0604020202020204" pitchFamily="34" charset="0"/>
+              </a:rPr>
+              <a:t>, 18PW03          TCP/IP Lab Package	   BitTorrent Client                         April 20, 2020</a:t>
+            </a:r>
+            <a:endParaRPr lang="en-US" altLang="zh-CN" sz="2000">
+              <a:solidFill>
+                <a:schemeClr val="bg1"/>
+              </a:solidFill>
+              <a:latin typeface="Arial" panose="020B0604020202020204" pitchFamily="34" charset="0"/>
+              <a:cs typeface="Arial" panose="020B0604020202020204" pitchFamily="34" charset="0"/>
+            </a:endParaRPr>
+          </a:p>
+        </p:txBody>
+      </p:sp>
+      <p:sp>
+        <p:nvSpPr>
+          <p:cNvPr id="2" name="Content Placeholder 1"/>
+          <p:cNvSpPr/>
+          <p:nvPr>
+            <p:ph idx="1"/>
+          </p:nvPr>
+        </p:nvSpPr>
+        <p:spPr>
+          <a:xfrm>
+            <a:off x="647700" y="1394460"/>
+            <a:ext cx="10515600" cy="4351338"/>
+          </a:xfrm>
+        </p:spPr>
+        <p:txBody>
+          <a:bodyPr>
+            <a:normAutofit lnSpcReduction="10000"/>
+          </a:bodyPr>
+          <a:p>
+            <a:pPr>
+              <a:lnSpc>
+                <a:spcPct val="130000"/>
+              </a:lnSpc>
+            </a:pPr>
+            <a:r>
+              <a:rPr lang="en-US" altLang="en-US" b="1"/>
+              <a:t>Understood how the BitTorrent protocol works in detail, and now can </a:t>
+            </a:r>
+            <a:r>
+              <a:rPr lang="" altLang="en-US" b="1"/>
+              <a:t>scale </a:t>
+            </a:r>
+            <a:r>
+              <a:rPr lang="en-US" altLang="en-US" b="1"/>
+              <a:t>the program using various revisions of the protocol to match big-time BitTorrent clients such as Transmission, UTtorrent. </a:t>
+            </a:r>
+            <a:endParaRPr lang="en-US" altLang="en-US" b="1"/>
+          </a:p>
+          <a:p>
+            <a:pPr>
+              <a:lnSpc>
+                <a:spcPct val="130000"/>
+              </a:lnSpc>
+            </a:pPr>
+            <a:endParaRPr lang="en-US" altLang="en-US" b="1"/>
+          </a:p>
+          <a:p>
+            <a:pPr>
+              <a:lnSpc>
+                <a:spcPct val="130000"/>
+              </a:lnSpc>
+            </a:pPr>
+            <a:endParaRPr lang="en-US" altLang="en-US" b="1"/>
+          </a:p>
+          <a:p>
+            <a:pPr>
+              <a:lnSpc>
+                <a:spcPct val="130000"/>
+              </a:lnSpc>
+            </a:pPr>
+            <a:endParaRPr lang="en-US" altLang="en-US" b="1"/>
+          </a:p>
+          <a:p>
+            <a:pPr>
+              <a:lnSpc>
+                <a:spcPct val="130000"/>
+              </a:lnSpc>
+            </a:pPr>
+            <a:endParaRPr lang="en-US" altLang="en-US" b="1"/>
+          </a:p>
+          <a:p>
+            <a:pPr>
+              <a:lnSpc>
+                <a:spcPct val="130000"/>
+              </a:lnSpc>
+            </a:pPr>
+            <a:r>
+              <a:rPr lang="" altLang="en-US" b="1"/>
+              <a:t>Learnt to decode and encode plain data into bytes-form extensively, and implementing them in python.</a:t>
+            </a:r>
+            <a:endParaRPr lang="en-US" altLang="en-US" b="1"/>
+          </a:p>
+          <a:p>
+            <a:pPr>
+              <a:lnSpc>
+                <a:spcPct val="130000"/>
+              </a:lnSpc>
+            </a:pPr>
+            <a:endParaRPr lang="en-US" altLang="en-US" b="1"/>
+          </a:p>
+          <a:p>
+            <a:pPr>
+              <a:lnSpc>
+                <a:spcPct val="130000"/>
+              </a:lnSpc>
+            </a:pPr>
+            <a:endParaRPr lang="en-US" altLang="en-US" b="1"/>
+          </a:p>
+        </p:txBody>
+      </p:sp>
+    </p:spTree>
+  </p:cSld>
+  <p:clrMapOvr>
+    <a:masterClrMapping/>
+  </p:clrMapOvr>
+</p:sld>
+</file>
+
+<file path=ppt/slides/slide26.xml><?xml version="1.0" encoding="utf-8"?>
+<p:sld xmlns:a="http://schemas.openxmlformats.org/drawingml/2006/main" xmlns:r="http://schemas.openxmlformats.org/officeDocument/2006/relationships" xmlns:p="http://schemas.openxmlformats.org/presentationml/2006/main">
+  <p:cSld>
+    <p:spTree>
+      <p:nvGrpSpPr>
+        <p:cNvPr id="1" name=""/>
+        <p:cNvGrpSpPr/>
+        <p:nvPr/>
+      </p:nvGrpSpPr>
+      <p:grpSpPr/>
+      <p:sp>
+        <p:nvSpPr>
+          <p:cNvPr id="5" name="Title 4"/>
+          <p:cNvSpPr>
+            <a:spLocks noGrp="1"/>
+          </p:cNvSpPr>
+          <p:nvPr>
+            <p:ph type="title"/>
+          </p:nvPr>
+        </p:nvSpPr>
+        <p:spPr/>
+        <p:txBody>
+          <a:bodyPr>
+            <a:normAutofit/>
+          </a:bodyPr>
+          <a:p>
+            <a:pPr algn="ctr"/>
+            <a:r>
+              <a:rPr lang="en-US" altLang="en-US" sz="4000">
+                <a:latin typeface="Gubbi" panose="00000400000000000000" charset="0"/>
+                <a:cs typeface="Gubbi" panose="00000400000000000000" charset="0"/>
+              </a:rPr>
+              <a:t>LEARNING CURVE</a:t>
+            </a:r>
+            <a:endParaRPr lang="en-US" altLang="en-US" sz="4000">
+              <a:latin typeface="Gubbi" panose="00000400000000000000" charset="0"/>
+              <a:cs typeface="Gubbi" panose="00000400000000000000" charset="0"/>
+            </a:endParaRPr>
+          </a:p>
+        </p:txBody>
+      </p:sp>
+      <p:sp>
+        <p:nvSpPr>
+          <p:cNvPr id="8" name="Footer Placeholder 7"/>
+          <p:cNvSpPr>
+            <a:spLocks noGrp="1"/>
+          </p:cNvSpPr>
+          <p:nvPr>
+            <p:ph type="ftr" sz="quarter" idx="11"/>
+          </p:nvPr>
+        </p:nvSpPr>
+        <p:spPr>
+          <a:xfrm>
+            <a:off x="-5715" y="6094730"/>
+            <a:ext cx="12193270" cy="765175"/>
+          </a:xfrm>
+          <a:solidFill>
+            <a:srgbClr val="8F1218"/>
+          </a:solidFill>
+        </p:spPr>
+        <p:txBody>
+          <a:bodyPr>
+            <a:normAutofit lnSpcReduction="10000"/>
+          </a:bodyPr>
+          <a:p>
+            <a:pPr algn="l"/>
+            <a:r>
+              <a:rPr lang="en-US" altLang="zh-CN" sz="2000">
+                <a:solidFill>
+                  <a:schemeClr val="bg1"/>
+                </a:solidFill>
+                <a:latin typeface="Arial" panose="020B0604020202020204" pitchFamily="34" charset="0"/>
+                <a:cs typeface="Arial" panose="020B0604020202020204" pitchFamily="34" charset="0"/>
+              </a:rPr>
+              <a:t>   </a:t>
+            </a:r>
+            <a:r>
+              <a:rPr lang="zh-CN" altLang="en-US" sz="2000">
+                <a:solidFill>
+                  <a:schemeClr val="bg1"/>
+                </a:solidFill>
+                <a:latin typeface="Arial" panose="020B0604020202020204" pitchFamily="34" charset="0"/>
+                <a:cs typeface="Arial" panose="020B0604020202020204" pitchFamily="34" charset="0"/>
+              </a:rPr>
+              <a:t>Arjun Ashok</a:t>
+            </a:r>
+            <a:r>
+              <a:rPr lang="en-US" altLang="zh-CN" sz="2000">
+                <a:solidFill>
+                  <a:schemeClr val="bg1"/>
+                </a:solidFill>
+                <a:latin typeface="Arial" panose="020B0604020202020204" pitchFamily="34" charset="0"/>
+                <a:cs typeface="Arial" panose="020B0604020202020204" pitchFamily="34" charset="0"/>
+              </a:rPr>
+              <a:t>, 18PW03          TCP/IP Lab Package	   BitTorrent Client                         April 20, 2020</a:t>
+            </a:r>
+            <a:endParaRPr lang="en-US" altLang="zh-CN" sz="2000">
+              <a:solidFill>
+                <a:schemeClr val="bg1"/>
+              </a:solidFill>
+              <a:latin typeface="Arial" panose="020B0604020202020204" pitchFamily="34" charset="0"/>
+              <a:cs typeface="Arial" panose="020B0604020202020204" pitchFamily="34" charset="0"/>
+            </a:endParaRPr>
+          </a:p>
+        </p:txBody>
+      </p:sp>
+      <p:sp>
+        <p:nvSpPr>
+          <p:cNvPr id="2" name="Content Placeholder 1"/>
+          <p:cNvSpPr/>
+          <p:nvPr>
+            <p:ph idx="1"/>
+          </p:nvPr>
+        </p:nvSpPr>
+        <p:spPr>
+          <a:xfrm>
+            <a:off x="647700" y="1394460"/>
+            <a:ext cx="10515600" cy="4351338"/>
+          </a:xfrm>
+        </p:spPr>
+        <p:txBody>
+          <a:bodyPr>
+            <a:normAutofit lnSpcReduction="10000"/>
+          </a:bodyPr>
+          <a:p>
+            <a:pPr>
+              <a:lnSpc>
+                <a:spcPct val="130000"/>
+              </a:lnSpc>
+            </a:pPr>
+            <a:r>
+              <a:rPr lang="en-US" altLang="en-US" b="1">
+                <a:sym typeface="+mn-ea"/>
+              </a:rPr>
+              <a:t>Implemented TCP sockets </a:t>
+            </a:r>
+            <a:r>
+              <a:rPr lang="en-US" altLang="en-US" b="1" u="sng">
+                <a:sym typeface="+mn-ea"/>
+              </a:rPr>
+              <a:t>asynchronously</a:t>
+            </a:r>
+            <a:r>
+              <a:rPr lang="en-US" altLang="en-US" b="1">
+                <a:sym typeface="+mn-ea"/>
+              </a:rPr>
+              <a:t>, and learnt how to continously get data and decode it properly.</a:t>
+            </a:r>
+            <a:endParaRPr lang="en-US" altLang="en-US" b="1">
+              <a:sym typeface="+mn-ea"/>
+            </a:endParaRPr>
+          </a:p>
+          <a:p>
+            <a:pPr>
+              <a:lnSpc>
+                <a:spcPct val="130000"/>
+              </a:lnSpc>
+            </a:pPr>
+            <a:endParaRPr lang="en-US" altLang="en-US" b="1">
+              <a:sym typeface="+mn-ea"/>
+            </a:endParaRPr>
+          </a:p>
+          <a:p>
+            <a:pPr>
+              <a:lnSpc>
+                <a:spcPct val="130000"/>
+              </a:lnSpc>
+            </a:pPr>
+            <a:endParaRPr lang="en-US" altLang="en-US" b="1"/>
+          </a:p>
+          <a:p>
+            <a:pPr>
+              <a:lnSpc>
+                <a:spcPct val="130000"/>
+              </a:lnSpc>
+            </a:pPr>
+            <a:r>
+              <a:rPr lang="en-US" altLang="en-US" b="1">
+                <a:sym typeface="+mn-ea"/>
+              </a:rPr>
+              <a:t>Learn how to work with HTTP and UDP trackers </a:t>
+            </a:r>
+            <a:r>
+              <a:rPr lang="en-US" altLang="en-US" b="1" u="sng">
+                <a:sym typeface="+mn-ea"/>
+              </a:rPr>
+              <a:t>asynchronously</a:t>
+            </a:r>
+            <a:r>
+              <a:rPr lang="en-US" altLang="en-US" b="1">
+                <a:sym typeface="+mn-ea"/>
+              </a:rPr>
+              <a:t>.</a:t>
+            </a:r>
+            <a:endParaRPr lang="en-US" altLang="en-US" b="1">
+              <a:sym typeface="+mn-ea"/>
+            </a:endParaRPr>
+          </a:p>
+          <a:p>
+            <a:pPr>
+              <a:lnSpc>
+                <a:spcPct val="130000"/>
+              </a:lnSpc>
+            </a:pPr>
+            <a:endParaRPr lang="en-US" altLang="en-US" b="1">
+              <a:sym typeface="+mn-ea"/>
+            </a:endParaRPr>
+          </a:p>
+          <a:p>
+            <a:pPr>
+              <a:lnSpc>
+                <a:spcPct val="130000"/>
+              </a:lnSpc>
+            </a:pPr>
+            <a:endParaRPr lang="en-US" altLang="en-US" b="1"/>
+          </a:p>
+          <a:p>
+            <a:pPr>
+              <a:lnSpc>
+                <a:spcPct val="130000"/>
+              </a:lnSpc>
+            </a:pPr>
+            <a:r>
+              <a:rPr lang="en-US" altLang="en-US" b="1">
+                <a:sym typeface="+mn-ea"/>
+              </a:rPr>
+              <a:t>Learnt how to debug the mistakes in the implementation using Wireshark to monitor packets and figure out what’s wrong.</a:t>
+            </a:r>
+            <a:endParaRPr lang="en-US" altLang="en-US" b="1"/>
+          </a:p>
+          <a:p>
+            <a:pPr>
+              <a:lnSpc>
+                <a:spcPct val="130000"/>
+              </a:lnSpc>
+            </a:pPr>
+            <a:endParaRPr lang="en-US" altLang="en-US" b="1"/>
+          </a:p>
+        </p:txBody>
+      </p:sp>
+    </p:spTree>
+  </p:cSld>
+  <p:clrMapOvr>
+    <a:masterClrMapping/>
+  </p:clrMapOvr>
+</p:sld>
+</file>
+
+<file path=ppt/slides/slide27.xml><?xml version="1.0" encoding="utf-8"?>
+<p:sld xmlns:a="http://schemas.openxmlformats.org/drawingml/2006/main" xmlns:r="http://schemas.openxmlformats.org/officeDocument/2006/relationships" xmlns:p="http://schemas.openxmlformats.org/presentationml/2006/main">
+  <p:cSld>
+    <p:spTree>
+      <p:nvGrpSpPr>
+        <p:cNvPr id="1" name=""/>
+        <p:cNvGrpSpPr/>
+        <p:nvPr/>
+      </p:nvGrpSpPr>
+      <p:grpSpPr/>
+      <p:sp>
+        <p:nvSpPr>
+          <p:cNvPr id="5" name="Title 4"/>
+          <p:cNvSpPr>
+            <a:spLocks noGrp="1"/>
+          </p:cNvSpPr>
+          <p:nvPr>
+            <p:ph type="title"/>
+          </p:nvPr>
+        </p:nvSpPr>
+        <p:spPr/>
+        <p:txBody>
+          <a:bodyPr>
+            <a:normAutofit/>
+          </a:bodyPr>
+          <a:p>
+            <a:pPr algn="ctr"/>
+            <a:r>
+              <a:rPr lang="" altLang="en-US" sz="4000">
+                <a:latin typeface="Gubbi" panose="00000400000000000000" charset="0"/>
+                <a:cs typeface="Gubbi" panose="00000400000000000000" charset="0"/>
+              </a:rPr>
+              <a:t>INSTRUCTIONS TO EXECUTE THE CODE</a:t>
+            </a:r>
+            <a:endParaRPr lang="" altLang="en-US" sz="4000">
+              <a:latin typeface="Gubbi" panose="00000400000000000000" charset="0"/>
+              <a:cs typeface="Gubbi" panose="00000400000000000000" charset="0"/>
+            </a:endParaRPr>
+          </a:p>
+        </p:txBody>
+      </p:sp>
+      <p:sp>
+        <p:nvSpPr>
+          <p:cNvPr id="8" name="Footer Placeholder 7"/>
+          <p:cNvSpPr>
+            <a:spLocks noGrp="1"/>
+          </p:cNvSpPr>
+          <p:nvPr>
+            <p:ph type="ftr" sz="quarter" idx="11"/>
+          </p:nvPr>
+        </p:nvSpPr>
+        <p:spPr>
+          <a:xfrm>
+            <a:off x="-5715" y="6094730"/>
+            <a:ext cx="12193270" cy="765175"/>
+          </a:xfrm>
+          <a:solidFill>
+            <a:srgbClr val="8F1218"/>
+          </a:solidFill>
+        </p:spPr>
+        <p:txBody>
+          <a:bodyPr>
+            <a:normAutofit lnSpcReduction="10000"/>
+          </a:bodyPr>
+          <a:p>
+            <a:pPr algn="l"/>
+            <a:r>
+              <a:rPr lang="en-US" altLang="zh-CN" sz="2000">
+                <a:solidFill>
+                  <a:schemeClr val="bg1"/>
+                </a:solidFill>
+                <a:latin typeface="Arial" panose="020B0604020202020204" pitchFamily="34" charset="0"/>
+                <a:cs typeface="Arial" panose="020B0604020202020204" pitchFamily="34" charset="0"/>
+              </a:rPr>
+              <a:t>   </a:t>
+            </a:r>
+            <a:r>
+              <a:rPr lang="zh-CN" altLang="en-US" sz="2000">
+                <a:solidFill>
+                  <a:schemeClr val="bg1"/>
+                </a:solidFill>
+                <a:latin typeface="Arial" panose="020B0604020202020204" pitchFamily="34" charset="0"/>
+                <a:cs typeface="Arial" panose="020B0604020202020204" pitchFamily="34" charset="0"/>
+              </a:rPr>
+              <a:t>Arjun Ashok</a:t>
+            </a:r>
+            <a:r>
+              <a:rPr lang="en-US" altLang="zh-CN" sz="2000">
+                <a:solidFill>
+                  <a:schemeClr val="bg1"/>
+                </a:solidFill>
+                <a:latin typeface="Arial" panose="020B0604020202020204" pitchFamily="34" charset="0"/>
+                <a:cs typeface="Arial" panose="020B0604020202020204" pitchFamily="34" charset="0"/>
+              </a:rPr>
+              <a:t>, 18PW03          TCP/IP Lab Package	   BitTorrent Client                         April 20, 2020</a:t>
+            </a:r>
+            <a:endParaRPr lang="en-US" altLang="zh-CN" sz="2000">
+              <a:solidFill>
+                <a:schemeClr val="bg1"/>
+              </a:solidFill>
+              <a:latin typeface="Arial" panose="020B0604020202020204" pitchFamily="34" charset="0"/>
+              <a:cs typeface="Arial" panose="020B0604020202020204" pitchFamily="34" charset="0"/>
+            </a:endParaRPr>
+          </a:p>
+        </p:txBody>
+      </p:sp>
+      <p:sp>
+        <p:nvSpPr>
+          <p:cNvPr id="2" name="Content Placeholder 1"/>
+          <p:cNvSpPr/>
+          <p:nvPr>
+            <p:ph idx="1"/>
+          </p:nvPr>
+        </p:nvSpPr>
+        <p:spPr/>
+        <p:txBody>
+          <a:bodyPr/>
+          <a:p>
+            <a:pPr>
+              <a:lnSpc>
+                <a:spcPct val="130000"/>
+              </a:lnSpc>
+            </a:pPr>
+            <a:r>
+              <a:rPr lang="" altLang="en-US" b="1"/>
+              <a:t>Download and unzip 18PW03_code.zip from the shared google drive folder.</a:t>
+            </a:r>
+            <a:endParaRPr lang="" altLang="en-US" b="1"/>
+          </a:p>
+          <a:p>
+            <a:pPr>
+              <a:lnSpc>
+                <a:spcPct val="130000"/>
+              </a:lnSpc>
+            </a:pPr>
+            <a:r>
+              <a:rPr lang="" altLang="en-US" b="1"/>
+              <a:t>You will see 3 folders and 2 files.</a:t>
+            </a:r>
+            <a:endParaRPr lang="" altLang="en-US" b="1"/>
+          </a:p>
+          <a:p>
+            <a:pPr>
+              <a:lnSpc>
+                <a:spcPct val="130000"/>
+              </a:lnSpc>
+            </a:pPr>
+            <a:r>
+              <a:rPr lang="" altLang="en-US" b="1"/>
+              <a:t>The README.txt file contains further instructions to compile the code and run it.</a:t>
+            </a:r>
+            <a:endParaRPr lang="en-US" altLang="en-US" b="1"/>
+          </a:p>
+          <a:p>
+            <a:pPr>
+              <a:lnSpc>
+                <a:spcPct val="130000"/>
+              </a:lnSpc>
+            </a:pPr>
+            <a:endParaRPr lang="en-US" altLang="en-US" b="1"/>
+          </a:p>
+        </p:txBody>
+      </p:sp>
+    </p:spTree>
+  </p:cSld>
+  <p:clrMapOvr>
+    <a:masterClrMapping/>
+  </p:clrMapOvr>
+</p:sld>
+</file>
+
+<file path=ppt/slides/slide28.xml><?xml version="1.0" encoding="utf-8"?>
+<p:sld xmlns:a="http://schemas.openxmlformats.org/drawingml/2006/main" xmlns:r="http://schemas.openxmlformats.org/officeDocument/2006/relationships" xmlns:p="http://schemas.openxmlformats.org/presentationml/2006/main">
+  <p:cSld>
+    <p:spTree>
+      <p:nvGrpSpPr>
+        <p:cNvPr id="1" name=""/>
+        <p:cNvGrpSpPr/>
+        <p:nvPr/>
+      </p:nvGrpSpPr>
+      <p:grpSpPr/>
+      <p:sp>
+        <p:nvSpPr>
+          <p:cNvPr id="5" name="Title 4"/>
+          <p:cNvSpPr>
+            <a:spLocks noGrp="1"/>
+          </p:cNvSpPr>
+          <p:nvPr>
+            <p:ph type="title"/>
+          </p:nvPr>
+        </p:nvSpPr>
+        <p:spPr>
+          <a:xfrm>
+            <a:off x="647700" y="2574290"/>
+            <a:ext cx="10515600" cy="1325563"/>
+          </a:xfrm>
+        </p:spPr>
+        <p:txBody>
+          <a:bodyPr>
+            <a:normAutofit/>
+          </a:bodyPr>
+          <a:p>
+            <a:pPr algn="ctr"/>
+            <a:r>
+              <a:rPr lang="en-US" altLang="en-US" sz="4000">
+                <a:latin typeface="Gubbi" panose="00000400000000000000" charset="0"/>
+                <a:cs typeface="Gubbi" panose="00000400000000000000" charset="0"/>
+              </a:rPr>
+              <a:t>THANK YOU!</a:t>
+            </a:r>
+            <a:endParaRPr lang="en-US" altLang="en-US" sz="4000">
+              <a:latin typeface="Gubbi" panose="00000400000000000000" charset="0"/>
+              <a:cs typeface="Gubbi" panose="00000400000000000000" charset="0"/>
+            </a:endParaRPr>
+          </a:p>
+        </p:txBody>
+      </p:sp>
+      <p:sp>
+        <p:nvSpPr>
+          <p:cNvPr id="8" name="Footer Placeholder 7"/>
+          <p:cNvSpPr>
+            <a:spLocks noGrp="1"/>
+          </p:cNvSpPr>
+          <p:nvPr>
+            <p:ph type="ftr" sz="quarter" idx="11"/>
+          </p:nvPr>
+        </p:nvSpPr>
+        <p:spPr>
+          <a:xfrm>
+            <a:off x="-5715" y="6094730"/>
+            <a:ext cx="12193270" cy="765175"/>
+          </a:xfrm>
+          <a:solidFill>
+            <a:srgbClr val="8F1218"/>
+          </a:solidFill>
+        </p:spPr>
+        <p:txBody>
+          <a:bodyPr>
+            <a:normAutofit lnSpcReduction="10000"/>
+          </a:bodyPr>
+          <a:p>
+            <a:pPr algn="l"/>
+            <a:r>
+              <a:rPr lang="en-US" altLang="zh-CN" sz="2000">
+                <a:solidFill>
+                  <a:schemeClr val="bg1"/>
+                </a:solidFill>
+                <a:latin typeface="Arial" panose="020B0604020202020204" pitchFamily="34" charset="0"/>
+                <a:cs typeface="Arial" panose="020B0604020202020204" pitchFamily="34" charset="0"/>
+              </a:rPr>
+              <a:t>   </a:t>
+            </a:r>
+            <a:r>
+              <a:rPr lang="zh-CN" altLang="en-US" sz="2000">
+                <a:solidFill>
+                  <a:schemeClr val="bg1"/>
+                </a:solidFill>
+                <a:latin typeface="Arial" panose="020B0604020202020204" pitchFamily="34" charset="0"/>
+                <a:cs typeface="Arial" panose="020B0604020202020204" pitchFamily="34" charset="0"/>
+              </a:rPr>
+              <a:t>Arjun Ashok</a:t>
+            </a:r>
+            <a:r>
+              <a:rPr lang="en-US" altLang="zh-CN" sz="2000">
+                <a:solidFill>
+                  <a:schemeClr val="bg1"/>
+                </a:solidFill>
+                <a:latin typeface="Arial" panose="020B0604020202020204" pitchFamily="34" charset="0"/>
+                <a:cs typeface="Arial" panose="020B0604020202020204" pitchFamily="34" charset="0"/>
+              </a:rPr>
+              <a:t>, 18PW03          TCP/IP Lab Package	   BitTorrent Client                         April 20, 2020</a:t>
+            </a:r>
+            <a:endParaRPr lang="en-US" altLang="zh-CN" sz="2000">
+              <a:solidFill>
+                <a:schemeClr val="bg1"/>
+              </a:solidFill>
+              <a:latin typeface="Arial" panose="020B0604020202020204" pitchFamily="34" charset="0"/>
+              <a:cs typeface="Arial" panose="020B0604020202020204" pitchFamily="34" charset="0"/>
+            </a:endParaRPr>
+          </a:p>
+        </p:txBody>
+      </p:sp>
+      <p:sp>
+        <p:nvSpPr>
+          <p:cNvPr id="2" name="Content Placeholder 1"/>
+          <p:cNvSpPr/>
+          <p:nvPr>
+            <p:ph idx="1"/>
+          </p:nvPr>
+        </p:nvSpPr>
+        <p:spPr/>
+        <p:txBody>
+          <a:bodyPr/>
+          <a:p>
+            <a:endParaRPr lang="en-US" altLang="en-US"/>
+          </a:p>
+          <a:p>
+            <a:endParaRPr lang="en-US" altLang="en-US"/>
+          </a:p>
+        </p:txBody>
+      </p:sp>
+    </p:spTree>
+  </p:cSld>
+  <p:clrMapOvr>
+    <a:masterClrMapping/>
+  </p:clrMapOvr>
+</p:sld>
+</file>
+
 <file path=ppt/slides/slide3.xml><?xml version="1.0" encoding="utf-8"?>
 <p:sld xmlns:a="http://schemas.openxmlformats.org/drawingml/2006/main" xmlns:r="http://schemas.openxmlformats.org/officeDocument/2006/relationships" xmlns:p="http://schemas.openxmlformats.org/presentationml/2006/main">
   <p:cSld>
@@ -6889,6 +9367,10 @@
               <a:rPr lang="en-US" altLang="en-US" b="1"/>
               <a:t>The problem statement is to implement the BitTorrent Protocol</a:t>
             </a:r>
+            <a:r>
+              <a:rPr lang="" altLang="en-US" b="1"/>
+              <a:t>.</a:t>
+            </a:r>
             <a:endParaRPr lang="en-US" altLang="en-US" b="1"/>
           </a:p>
           <a:p>
@@ -6899,7 +9381,15 @@
             <a:pPr algn="just"/>
             <a:r>
               <a:rPr lang="en-US" altLang="en-US" b="1"/>
-              <a:t>Designed in 2001 by</a:t>
+              <a:t>Designed in </a:t>
+            </a:r>
+            <a:r>
+              <a:rPr lang="" altLang="en-US" b="1"/>
+              <a:t>2008 </a:t>
+            </a:r>
+            <a:r>
+              <a:rPr lang="en-US" altLang="en-US" b="1"/>
+              <a:t>by</a:t>
             </a:r>
             <a:r>
               <a:rPr lang="en-US" altLang="en-US"/>
@@ -7148,8 +9638,12 @@
               </a:lnSpc>
             </a:pPr>
             <a:r>
+              <a:rPr lang="" altLang="en-US" b="1"/>
+              <a:t>Objective and s</a:t>
+            </a:r>
+            <a:r>
               <a:rPr lang="en-US" altLang="en-US" b="1"/>
-              <a:t>Scope of the project: To implement a fully-functional </a:t>
+              <a:t>cope of the project: To implement a fully-functional </a:t>
             </a:r>
             <a:r>
               <a:rPr lang="en-US" altLang="en-US" b="1" u="sng"/>
@@ -7507,7 +10001,7 @@
         </p:spPr>
         <p:txBody>
           <a:bodyPr>
-            <a:normAutofit lnSpcReduction="20000"/>
+            <a:normAutofit/>
           </a:bodyPr>
           <a:p>
             <a:pPr algn="l"/>
@@ -7520,10 +10014,26 @@
               </a:lnSpc>
             </a:pPr>
             <a:r>
-              <a:rPr lang="en-US" altLang="en-US" b="1"/>
-              <a:t>As BitTorrent is a peer-to-peer protocol, many peers contain various parts(either partially or completely) of the file.</a:t>
-            </a:r>
-            <a:endParaRPr lang="en-US" altLang="en-US" b="1"/>
+              <a:rPr lang="en-US" altLang="en-US" b="1">
+                <a:sym typeface="+mn-ea"/>
+              </a:rPr>
+              <a:t>Every file which relate to a torrent(which can be transferred using the BitTorrent protocol) is internally divided into </a:t>
+            </a:r>
+            <a:r>
+              <a:rPr lang="en-US" altLang="en-US" b="1" u="sng">
+                <a:sym typeface="+mn-ea"/>
+              </a:rPr>
+              <a:t>pieces of equal length(except last piece)</a:t>
+            </a:r>
+            <a:r>
+              <a:rPr lang="en-US" altLang="en-US" b="1">
+                <a:sym typeface="+mn-ea"/>
+              </a:rPr>
+              <a:t> and the .torrent file stores the pieces and the SHA1 hash of every piece.</a:t>
+            </a:r>
+            <a:endParaRPr lang="en-US" altLang="en-US" b="1">
+              <a:sym typeface="+mn-ea"/>
+            </a:endParaRPr>
           </a:p>
           <a:p>
             <a:pPr algn="l">
@@ -7531,11 +10041,9 @@
                 <a:spcPct val="160000"/>
               </a:lnSpc>
             </a:pPr>
-            <a:r>
-              <a:rPr lang="en-US" altLang="en-US" b="1"/>
-              <a:t>There is a HTTP server called a tracker, which returns a list of peers when it is requested. Let us see how.</a:t>
-            </a:r>
-            <a:endParaRPr lang="en-US" altLang="en-US" b="1"/>
+            <a:endParaRPr lang="en-US" altLang="en-US" b="1">
+              <a:sym typeface="+mn-ea"/>
+            </a:endParaRPr>
           </a:p>
           <a:p>
             <a:pPr algn="l">
@@ -7543,18 +10051,6 @@
                 <a:spcPct val="160000"/>
               </a:lnSpc>
             </a:pPr>
-            <a:r>
-              <a:rPr lang="en-US" altLang="en-US" b="1"/>
-              <a:t>Every file which relate to a torrent(which can be transferred using the BitTorrent protocol) is internally divided into </a:t>
-            </a:r>
-            <a:r>
-              <a:rPr lang="en-US" altLang="en-US" b="1" u="sng"/>
-              <a:t>pieces of equal length(except last piece)</a:t>
-            </a:r>
-            <a:r>
-              <a:rPr lang="en-US" altLang="en-US" b="1"/>
-              <a:t> and the .torrent file stores the pieces and the SHA1 hash of every piece.</a:t>
-            </a:r>
             <a:endParaRPr lang="en-US" altLang="en-US" b="1"/>
           </a:p>
           <a:p>
@@ -7564,9 +10060,19 @@
               </a:lnSpc>
             </a:pPr>
             <a:r>
-              <a:rPr lang="en-US" altLang="en-US" b="1"/>
-              <a:t>A torrent file will contain the URL of the tracker, along with the hash of the pieces. </a:t>
-            </a:r>
+              <a:rPr lang="en-US" altLang="en-US" b="1">
+                <a:sym typeface="+mn-ea"/>
+              </a:rPr>
+              <a:t>A torrent file will contain the URL of the tracker, along with the hash of the pieces.</a:t>
+            </a:r>
+            <a:endParaRPr lang="en-US" altLang="en-US" b="1"/>
+          </a:p>
+          <a:p>
+            <a:pPr algn="l">
+              <a:lnSpc>
+                <a:spcPct val="160000"/>
+              </a:lnSpc>
+            </a:pPr>
             <a:endParaRPr lang="en-US" altLang="en-US" b="1"/>
           </a:p>
           <a:p>

</xml_diff>

<commit_message>
Final commit - project submitted!
</commit_message>
<xml_diff>
--- a/Demo_Presentation.pptx
+++ b/Demo_Presentation.pptx
@@ -7583,23 +7583,23 @@
           </a:bodyPr>
           <a:p>
             <a:r>
-              <a:rPr lang="" altLang="en-US" b="1"/>
+              <a:rPr lang="en-US" altLang="en-US" b="1"/>
               <a:t>Total lines of code - 1350</a:t>
             </a:r>
-            <a:endParaRPr lang="" altLang="en-US" b="1"/>
-          </a:p>
-          <a:p>
-            <a:r>
-              <a:rPr lang="" altLang="en-US" b="1"/>
+            <a:endParaRPr lang="en-US" altLang="en-US" b="1"/>
+          </a:p>
+          <a:p>
+            <a:r>
+              <a:rPr lang="en-US" altLang="en-US" b="1"/>
               <a:t>Split into 6 files(each file represents a concept in the form of many classes)</a:t>
             </a:r>
-            <a:endParaRPr lang="" altLang="en-US" b="1"/>
-          </a:p>
-          <a:p>
-            <a:endParaRPr lang="" altLang="en-US" b="1"/>
-          </a:p>
-          <a:p>
-            <a:endParaRPr lang="" altLang="en-US" b="1"/>
+            <a:endParaRPr lang="en-US" altLang="en-US" b="1"/>
+          </a:p>
+          <a:p>
+            <a:endParaRPr lang="en-US" altLang="en-US" b="1"/>
+          </a:p>
+          <a:p>
+            <a:endParaRPr lang="en-US" altLang="en-US" b="1"/>
           </a:p>
           <a:p>
             <a:pPr marL="0" indent="0">
@@ -7609,18 +7609,18 @@
               <a:buNone/>
             </a:pPr>
             <a:r>
-              <a:rPr lang="" altLang="en-US" b="1"/>
+              <a:rPr lang="en-US" altLang="en-US" b="1"/>
               <a:t>1. </a:t>
             </a:r>
             <a:r>
-              <a:rPr lang="" altLang="en-US" b="1" u="sng"/>
+              <a:rPr lang="en-US" altLang="en-US" b="1" u="sng"/>
               <a:t>own_bencoding.py</a:t>
             </a:r>
             <a:r>
-              <a:rPr lang="" altLang="en-US" b="1"/>
+              <a:rPr lang="en-US" altLang="en-US" b="1"/>
               <a:t> - Contains classes Encoder and Decoder for bencoding and bdecoding respectively</a:t>
             </a:r>
-            <a:endParaRPr lang="" altLang="en-US" b="1"/>
+            <a:endParaRPr lang="en-US" altLang="en-US" b="1"/>
           </a:p>
           <a:p>
             <a:pPr marL="0" indent="0">
@@ -7629,7 +7629,7 @@
               </a:lnSpc>
               <a:buNone/>
             </a:pPr>
-            <a:endParaRPr lang="" altLang="en-US" b="1"/>
+            <a:endParaRPr lang="en-US" altLang="en-US" b="1"/>
           </a:p>
           <a:p>
             <a:pPr marL="0" indent="0">
@@ -7638,25 +7638,25 @@
               </a:lnSpc>
               <a:buNone/>
             </a:pPr>
-            <a:endParaRPr lang="" altLang="en-US" b="1"/>
+            <a:endParaRPr lang="en-US" altLang="en-US" b="1"/>
           </a:p>
           <a:p>
             <a:pPr marL="0" indent="0">
               <a:buNone/>
             </a:pPr>
             <a:r>
-              <a:rPr lang="" altLang="en-US" b="1"/>
+              <a:rPr lang="en-US" altLang="en-US" b="1"/>
               <a:t>2. </a:t>
             </a:r>
             <a:r>
-              <a:rPr lang="" altLang="en-US" b="1" u="sng"/>
+              <a:rPr lang="en-US" altLang="en-US" b="1" u="sng"/>
               <a:t>tracker.py</a:t>
             </a:r>
             <a:r>
-              <a:rPr lang="" altLang="en-US" b="1"/>
+              <a:rPr lang="en-US" altLang="en-US" b="1"/>
               <a:t> - Contains tracker class</a:t>
             </a:r>
-            <a:endParaRPr lang="" altLang="en-US" b="1"/>
+            <a:endParaRPr lang="en-US" altLang="en-US" b="1"/>
           </a:p>
           <a:p>
             <a:pPr marL="0" indent="0">
@@ -7665,7 +7665,7 @@
               </a:lnSpc>
               <a:buNone/>
             </a:pPr>
-            <a:endParaRPr lang="" altLang="en-US" b="1"/>
+            <a:endParaRPr lang="en-US" altLang="en-US" b="1"/>
           </a:p>
         </p:txBody>
       </p:sp>
@@ -8369,10 +8369,10 @@
           </a:p>
           <a:p>
             <a:r>
-              <a:rPr lang="" altLang="en-US" b="1"/>
+              <a:rPr lang="en-US" altLang="en-US" b="1"/>
               <a:t>Walk-through the code.</a:t>
             </a:r>
-            <a:endParaRPr lang="" altLang="en-US" b="1"/>
+            <a:endParaRPr lang="en-US" altLang="en-US" b="1"/>
           </a:p>
         </p:txBody>
       </p:sp>
@@ -8663,58 +8663,50 @@
             </a:pPr>
             <a:r>
               <a:rPr lang="en-US" altLang="en-US" b="1"/>
-              <a:t>Understood how the BitTorrent protocol works in detail, and now can </a:t>
-            </a:r>
-            <a:r>
-              <a:rPr lang="" altLang="en-US" b="1"/>
-              <a:t>scale </a:t>
-            </a:r>
+              <a:t>Understood how the BitTorrent protocol works in detail, and now can scale the program using various revisions of the protocol to match big-time BitTorrent clients such as Transmission, UTtorrent. </a:t>
+            </a:r>
+            <a:endParaRPr lang="en-US" altLang="en-US" b="1"/>
+          </a:p>
+          <a:p>
+            <a:pPr>
+              <a:lnSpc>
+                <a:spcPct val="130000"/>
+              </a:lnSpc>
+            </a:pPr>
+            <a:endParaRPr lang="en-US" altLang="en-US" b="1"/>
+          </a:p>
+          <a:p>
+            <a:pPr>
+              <a:lnSpc>
+                <a:spcPct val="130000"/>
+              </a:lnSpc>
+            </a:pPr>
+            <a:endParaRPr lang="en-US" altLang="en-US" b="1"/>
+          </a:p>
+          <a:p>
+            <a:pPr>
+              <a:lnSpc>
+                <a:spcPct val="130000"/>
+              </a:lnSpc>
+            </a:pPr>
+            <a:endParaRPr lang="en-US" altLang="en-US" b="1"/>
+          </a:p>
+          <a:p>
+            <a:pPr>
+              <a:lnSpc>
+                <a:spcPct val="130000"/>
+              </a:lnSpc>
+            </a:pPr>
+            <a:endParaRPr lang="en-US" altLang="en-US" b="1"/>
+          </a:p>
+          <a:p>
+            <a:pPr>
+              <a:lnSpc>
+                <a:spcPct val="130000"/>
+              </a:lnSpc>
+            </a:pPr>
             <a:r>
               <a:rPr lang="en-US" altLang="en-US" b="1"/>
-              <a:t>the program using various revisions of the protocol to match big-time BitTorrent clients such as Transmission, UTtorrent. </a:t>
-            </a:r>
-            <a:endParaRPr lang="en-US" altLang="en-US" b="1"/>
-          </a:p>
-          <a:p>
-            <a:pPr>
-              <a:lnSpc>
-                <a:spcPct val="130000"/>
-              </a:lnSpc>
-            </a:pPr>
-            <a:endParaRPr lang="en-US" altLang="en-US" b="1"/>
-          </a:p>
-          <a:p>
-            <a:pPr>
-              <a:lnSpc>
-                <a:spcPct val="130000"/>
-              </a:lnSpc>
-            </a:pPr>
-            <a:endParaRPr lang="en-US" altLang="en-US" b="1"/>
-          </a:p>
-          <a:p>
-            <a:pPr>
-              <a:lnSpc>
-                <a:spcPct val="130000"/>
-              </a:lnSpc>
-            </a:pPr>
-            <a:endParaRPr lang="en-US" altLang="en-US" b="1"/>
-          </a:p>
-          <a:p>
-            <a:pPr>
-              <a:lnSpc>
-                <a:spcPct val="130000"/>
-              </a:lnSpc>
-            </a:pPr>
-            <a:endParaRPr lang="en-US" altLang="en-US" b="1"/>
-          </a:p>
-          <a:p>
-            <a:pPr>
-              <a:lnSpc>
-                <a:spcPct val="130000"/>
-              </a:lnSpc>
-            </a:pPr>
-            <a:r>
-              <a:rPr lang="" altLang="en-US" b="1"/>
               <a:t>Learnt to decode and encode plain data into bytes-form extensively, and implementing them in python.</a:t>
             </a:r>
             <a:endParaRPr lang="en-US" altLang="en-US" b="1"/>
@@ -9021,13 +9013,13 @@
           <a:p>
             <a:pPr algn="ctr"/>
             <a:r>
-              <a:rPr lang="" altLang="en-US" sz="4000">
+              <a:rPr lang="en-US" altLang="en-US" sz="4000">
                 <a:latin typeface="Gubbi" panose="00000400000000000000" charset="0"/>
                 <a:cs typeface="Gubbi" panose="00000400000000000000" charset="0"/>
               </a:rPr>
               <a:t>INSTRUCTIONS TO EXECUTE THE CODE</a:t>
             </a:r>
-            <a:endParaRPr lang="" altLang="en-US" sz="4000">
+            <a:endParaRPr lang="en-US" altLang="en-US" sz="4000">
               <a:latin typeface="Gubbi" panose="00000400000000000000" charset="0"/>
               <a:cs typeface="Gubbi" panose="00000400000000000000" charset="0"/>
             </a:endParaRPr>
@@ -9117,10 +9109,10 @@
               </a:lnSpc>
             </a:pPr>
             <a:r>
-              <a:rPr lang="" altLang="en-US" b="1"/>
+              <a:rPr lang="en-US" altLang="en-US" b="1"/>
               <a:t>Download and unzip 18PW03_code.zip from the shared google drive folder.</a:t>
             </a:r>
-            <a:endParaRPr lang="" altLang="en-US" b="1"/>
+            <a:endParaRPr lang="en-US" altLang="en-US" b="1"/>
           </a:p>
           <a:p>
             <a:pPr>
@@ -9129,10 +9121,10 @@
               </a:lnSpc>
             </a:pPr>
             <a:r>
-              <a:rPr lang="" altLang="en-US" b="1"/>
+              <a:rPr lang="en-US" altLang="en-US" b="1"/>
               <a:t>You will see 3 folders and 2 files.</a:t>
             </a:r>
-            <a:endParaRPr lang="" altLang="en-US" b="1"/>
+            <a:endParaRPr lang="en-US" altLang="en-US" b="1"/>
           </a:p>
           <a:p>
             <a:pPr>
@@ -9141,7 +9133,7 @@
               </a:lnSpc>
             </a:pPr>
             <a:r>
-              <a:rPr lang="" altLang="en-US" b="1"/>
+              <a:rPr lang="en-US" altLang="en-US" b="1"/>
               <a:t>The README.txt file contains further instructions to compile the code and run it.</a:t>
             </a:r>
             <a:endParaRPr lang="en-US" altLang="en-US" b="1"/>
@@ -9365,11 +9357,7 @@
             <a:pPr algn="l"/>
             <a:r>
               <a:rPr lang="en-US" altLang="en-US" b="1"/>
-              <a:t>The problem statement is to implement the BitTorrent Protocol</a:t>
-            </a:r>
-            <a:r>
-              <a:rPr lang="" altLang="en-US" b="1"/>
-              <a:t>.</a:t>
+              <a:t>The problem statement is to implement the BitTorrent Protocol.</a:t>
             </a:r>
             <a:endParaRPr lang="en-US" altLang="en-US" b="1"/>
           </a:p>
@@ -9381,15 +9369,7 @@
             <a:pPr algn="just"/>
             <a:r>
               <a:rPr lang="en-US" altLang="en-US" b="1"/>
-              <a:t>Designed in </a:t>
-            </a:r>
-            <a:r>
-              <a:rPr lang="" altLang="en-US" b="1"/>
-              <a:t>2008 </a:t>
-            </a:r>
-            <a:r>
-              <a:rPr lang="en-US" altLang="en-US" b="1"/>
-              <a:t>by</a:t>
+              <a:t>Designed in 2008 by</a:t>
             </a:r>
             <a:r>
               <a:rPr lang="en-US" altLang="en-US"/>
@@ -9638,12 +9618,8 @@
               </a:lnSpc>
             </a:pPr>
             <a:r>
-              <a:rPr lang="" altLang="en-US" b="1"/>
-              <a:t>Objective and s</a:t>
-            </a:r>
-            <a:r>
               <a:rPr lang="en-US" altLang="en-US" b="1"/>
-              <a:t>cope of the project: To implement a fully-functional </a:t>
+              <a:t>Objective and scope of the project: To implement a fully-functional </a:t>
             </a:r>
             <a:r>
               <a:rPr lang="en-US" altLang="en-US" b="1" u="sng"/>

</xml_diff>